<commit_message>
added works-cited.pdf, R project for activities; updated ppt
</commit_message>
<xml_diff>
--- a/Stats-for-Comp-Bio.pptx
+++ b/Stats-for-Comp-Bio.pptx
@@ -5,7 +5,7 @@
     <p:sldMasterId id="2147483720" r:id="rId1"/>
   </p:sldMasterIdLst>
   <p:notesMasterIdLst>
-    <p:notesMasterId r:id="rId47"/>
+    <p:notesMasterId r:id="rId50"/>
   </p:notesMasterIdLst>
   <p:sldIdLst>
     <p:sldId id="256" r:id="rId2"/>
@@ -20,39 +20,42 @@
     <p:sldId id="270" r:id="rId11"/>
     <p:sldId id="271" r:id="rId12"/>
     <p:sldId id="272" r:id="rId13"/>
-    <p:sldId id="273" r:id="rId14"/>
-    <p:sldId id="274" r:id="rId15"/>
-    <p:sldId id="259" r:id="rId16"/>
-    <p:sldId id="275" r:id="rId17"/>
-    <p:sldId id="276" r:id="rId18"/>
-    <p:sldId id="277" r:id="rId19"/>
-    <p:sldId id="278" r:id="rId20"/>
-    <p:sldId id="279" r:id="rId21"/>
-    <p:sldId id="280" r:id="rId22"/>
-    <p:sldId id="260" r:id="rId23"/>
-    <p:sldId id="281" r:id="rId24"/>
-    <p:sldId id="282" r:id="rId25"/>
-    <p:sldId id="261" r:id="rId26"/>
-    <p:sldId id="284" r:id="rId27"/>
-    <p:sldId id="285" r:id="rId28"/>
-    <p:sldId id="286" r:id="rId29"/>
-    <p:sldId id="287" r:id="rId30"/>
-    <p:sldId id="288" r:id="rId31"/>
-    <p:sldId id="262" r:id="rId32"/>
-    <p:sldId id="289" r:id="rId33"/>
-    <p:sldId id="290" r:id="rId34"/>
-    <p:sldId id="291" r:id="rId35"/>
-    <p:sldId id="292" r:id="rId36"/>
-    <p:sldId id="293" r:id="rId37"/>
-    <p:sldId id="283" r:id="rId38"/>
-    <p:sldId id="263" r:id="rId39"/>
-    <p:sldId id="294" r:id="rId40"/>
-    <p:sldId id="295" r:id="rId41"/>
-    <p:sldId id="296" r:id="rId42"/>
-    <p:sldId id="297" r:id="rId43"/>
-    <p:sldId id="264" r:id="rId44"/>
-    <p:sldId id="298" r:id="rId45"/>
-    <p:sldId id="299" r:id="rId46"/>
+    <p:sldId id="302" r:id="rId14"/>
+    <p:sldId id="273" r:id="rId15"/>
+    <p:sldId id="274" r:id="rId16"/>
+    <p:sldId id="301" r:id="rId17"/>
+    <p:sldId id="259" r:id="rId18"/>
+    <p:sldId id="275" r:id="rId19"/>
+    <p:sldId id="276" r:id="rId20"/>
+    <p:sldId id="277" r:id="rId21"/>
+    <p:sldId id="278" r:id="rId22"/>
+    <p:sldId id="279" r:id="rId23"/>
+    <p:sldId id="280" r:id="rId24"/>
+    <p:sldId id="260" r:id="rId25"/>
+    <p:sldId id="281" r:id="rId26"/>
+    <p:sldId id="282" r:id="rId27"/>
+    <p:sldId id="303" r:id="rId28"/>
+    <p:sldId id="261" r:id="rId29"/>
+    <p:sldId id="284" r:id="rId30"/>
+    <p:sldId id="285" r:id="rId31"/>
+    <p:sldId id="286" r:id="rId32"/>
+    <p:sldId id="287" r:id="rId33"/>
+    <p:sldId id="288" r:id="rId34"/>
+    <p:sldId id="262" r:id="rId35"/>
+    <p:sldId id="289" r:id="rId36"/>
+    <p:sldId id="290" r:id="rId37"/>
+    <p:sldId id="291" r:id="rId38"/>
+    <p:sldId id="292" r:id="rId39"/>
+    <p:sldId id="293" r:id="rId40"/>
+    <p:sldId id="283" r:id="rId41"/>
+    <p:sldId id="263" r:id="rId42"/>
+    <p:sldId id="294" r:id="rId43"/>
+    <p:sldId id="295" r:id="rId44"/>
+    <p:sldId id="296" r:id="rId45"/>
+    <p:sldId id="297" r:id="rId46"/>
+    <p:sldId id="264" r:id="rId47"/>
+    <p:sldId id="298" r:id="rId48"/>
+    <p:sldId id="299" r:id="rId49"/>
   </p:sldIdLst>
   <p:sldSz cx="12192000" cy="6858000"/>
   <p:notesSz cx="6858000" cy="9144000"/>
@@ -151,6 +154,11 @@
       </a:defRPr>
     </a:lvl9pPr>
   </p:defaultTextStyle>
+  <p:extLst>
+    <p:ext uri="{EFAFB233-063F-42B5-8137-9DF3F51BA10A}">
+      <p15:sldGuideLst xmlns:p15="http://schemas.microsoft.com/office/powerpoint/2012/main"/>
+    </p:ext>
+  </p:extLst>
 </p:presentation>
 </file>
 
@@ -5740,7 +5748,7 @@
   <dgm:whole/>
   <dgm:extLst>
     <a:ext uri="http://schemas.microsoft.com/office/drawing/2008/diagram">
-      <dsp:dataModelExt xmlns:dsp="http://schemas.microsoft.com/office/drawing/2008/diagram" relId="rId6" minVer="http://schemas.openxmlformats.org/drawingml/2006/diagram"/>
+      <dsp:dataModelExt xmlns:dsp="http://schemas.microsoft.com/office/drawing/2008/diagram" relId="rId7" minVer="http://schemas.openxmlformats.org/drawingml/2006/diagram"/>
     </a:ext>
   </dgm:extLst>
 </dgm:dataModel>
@@ -15745,7 +15753,7 @@
           <a:p>
             <a:fld id="{175AC318-6113-B742-8151-DEA7C3340462}" type="datetimeFigureOut">
               <a:rPr lang="en-US" smtClean="0"/>
-              <a:t>3/13/24</a:t>
+              <a:t>3/14/24</a:t>
             </a:fld>
             <a:endParaRPr lang="en-US"/>
           </a:p>
@@ -16058,15 +16066,27 @@
           <a:p>
             <a:r>
               <a:rPr lang="en-US" dirty="0"/>
-              <a:t>Helpful: https://</a:t>
+              <a:t>Talk </a:t>
             </a:r>
             <a:r>
-              <a:rPr lang="en-US" dirty="0" err="1"/>
-              <a:t>typeset.io</a:t>
+              <a:rPr lang="en-US"/>
+              <a:t>+ Q&amp;A: </a:t>
             </a:r>
             <a:r>
               <a:rPr lang="en-US" dirty="0"/>
-              <a:t>/questions/what-are-the-advantages-and-disadvantages-of-each-post-hoc-2y0f3tm72p</a:t>
+              <a:t>50 minutes</a:t>
+            </a:r>
+          </a:p>
+          <a:p>
+            <a:r>
+              <a:rPr lang="en-US" dirty="0"/>
+              <a:t>Activities: 1 hour</a:t>
+            </a:r>
+          </a:p>
+          <a:p>
+            <a:r>
+              <a:rPr lang="en-US" dirty="0"/>
+              <a:t>Break: 10 minutes</a:t>
             </a:r>
           </a:p>
         </p:txBody>
@@ -16088,7 +16108,7 @@
           <a:p>
             <a:fld id="{23C4817C-9E78-494C-A089-F217C38E8593}" type="slidenum">
               <a:rPr lang="en-US" smtClean="0"/>
-              <a:t>6</a:t>
+              <a:t>1</a:t>
             </a:fld>
             <a:endParaRPr lang="en-US"/>
           </a:p>
@@ -16097,7 +16117,268 @@
     </p:spTree>
     <p:extLst>
       <p:ext uri="{BB962C8B-B14F-4D97-AF65-F5344CB8AC3E}">
-        <p14:creationId xmlns:p14="http://schemas.microsoft.com/office/powerpoint/2010/main" val="3897303939"/>
+        <p14:creationId xmlns:p14="http://schemas.microsoft.com/office/powerpoint/2010/main" val="1669998438"/>
+      </p:ext>
+    </p:extLst>
+  </p:cSld>
+  <p:clrMapOvr>
+    <a:masterClrMapping/>
+  </p:clrMapOvr>
+</p:notes>
+</file>
+
+<file path=ppt/notesSlides/notesSlide10.xml><?xml version="1.0" encoding="utf-8"?>
+<p:notes xmlns:a="http://schemas.openxmlformats.org/drawingml/2006/main" xmlns:r="http://schemas.openxmlformats.org/officeDocument/2006/relationships" xmlns:p="http://schemas.openxmlformats.org/presentationml/2006/main">
+  <p:cSld>
+    <p:spTree>
+      <p:nvGrpSpPr>
+        <p:cNvPr id="1" name=""/>
+        <p:cNvGrpSpPr/>
+        <p:nvPr/>
+      </p:nvGrpSpPr>
+      <p:grpSpPr>
+        <a:xfrm>
+          <a:off x="0" y="0"/>
+          <a:ext cx="0" cy="0"/>
+          <a:chOff x="0" y="0"/>
+          <a:chExt cx="0" cy="0"/>
+        </a:xfrm>
+      </p:grpSpPr>
+      <p:sp>
+        <p:nvSpPr>
+          <p:cNvPr id="2" name="Slide Image Placeholder 1"/>
+          <p:cNvSpPr>
+            <a:spLocks noGrp="1" noRot="1" noChangeAspect="1"/>
+          </p:cNvSpPr>
+          <p:nvPr>
+            <p:ph type="sldImg"/>
+          </p:nvPr>
+        </p:nvSpPr>
+        <p:spPr/>
+      </p:sp>
+      <p:sp>
+        <p:nvSpPr>
+          <p:cNvPr id="3" name="Notes Placeholder 2"/>
+          <p:cNvSpPr>
+            <a:spLocks noGrp="1"/>
+          </p:cNvSpPr>
+          <p:nvPr>
+            <p:ph type="body" idx="1"/>
+          </p:nvPr>
+        </p:nvSpPr>
+        <p:spPr/>
+        <p:txBody>
+          <a:bodyPr/>
+          <a:lstStyle/>
+          <a:p>
+            <a:r>
+              <a:rPr lang="en-US" dirty="0"/>
+              <a:t>10-15 minutes</a:t>
+            </a:r>
+          </a:p>
+        </p:txBody>
+      </p:sp>
+      <p:sp>
+        <p:nvSpPr>
+          <p:cNvPr id="4" name="Slide Number Placeholder 3"/>
+          <p:cNvSpPr>
+            <a:spLocks noGrp="1"/>
+          </p:cNvSpPr>
+          <p:nvPr>
+            <p:ph type="sldNum" sz="quarter" idx="5"/>
+          </p:nvPr>
+        </p:nvSpPr>
+        <p:spPr/>
+        <p:txBody>
+          <a:bodyPr/>
+          <a:lstStyle/>
+          <a:p>
+            <a:fld id="{23C4817C-9E78-494C-A089-F217C38E8593}" type="slidenum">
+              <a:rPr lang="en-US" smtClean="0"/>
+              <a:t>33</a:t>
+            </a:fld>
+            <a:endParaRPr lang="en-US"/>
+          </a:p>
+        </p:txBody>
+      </p:sp>
+    </p:spTree>
+    <p:extLst>
+      <p:ext uri="{BB962C8B-B14F-4D97-AF65-F5344CB8AC3E}">
+        <p14:creationId xmlns:p14="http://schemas.microsoft.com/office/powerpoint/2010/main" val="1365925587"/>
+      </p:ext>
+    </p:extLst>
+  </p:cSld>
+  <p:clrMapOvr>
+    <a:masterClrMapping/>
+  </p:clrMapOvr>
+</p:notes>
+</file>
+
+<file path=ppt/notesSlides/notesSlide11.xml><?xml version="1.0" encoding="utf-8"?>
+<p:notes xmlns:a="http://schemas.openxmlformats.org/drawingml/2006/main" xmlns:r="http://schemas.openxmlformats.org/officeDocument/2006/relationships" xmlns:p="http://schemas.openxmlformats.org/presentationml/2006/main">
+  <p:cSld>
+    <p:spTree>
+      <p:nvGrpSpPr>
+        <p:cNvPr id="1" name=""/>
+        <p:cNvGrpSpPr/>
+        <p:nvPr/>
+      </p:nvGrpSpPr>
+      <p:grpSpPr>
+        <a:xfrm>
+          <a:off x="0" y="0"/>
+          <a:ext cx="0" cy="0"/>
+          <a:chOff x="0" y="0"/>
+          <a:chExt cx="0" cy="0"/>
+        </a:xfrm>
+      </p:grpSpPr>
+      <p:sp>
+        <p:nvSpPr>
+          <p:cNvPr id="2" name="Slide Image Placeholder 1"/>
+          <p:cNvSpPr>
+            <a:spLocks noGrp="1" noRot="1" noChangeAspect="1"/>
+          </p:cNvSpPr>
+          <p:nvPr>
+            <p:ph type="sldImg"/>
+          </p:nvPr>
+        </p:nvSpPr>
+        <p:spPr/>
+      </p:sp>
+      <p:sp>
+        <p:nvSpPr>
+          <p:cNvPr id="3" name="Notes Placeholder 2"/>
+          <p:cNvSpPr>
+            <a:spLocks noGrp="1"/>
+          </p:cNvSpPr>
+          <p:nvPr>
+            <p:ph type="body" idx="1"/>
+          </p:nvPr>
+        </p:nvSpPr>
+        <p:spPr/>
+        <p:txBody>
+          <a:bodyPr/>
+          <a:lstStyle/>
+          <a:p>
+            <a:r>
+              <a:rPr lang="en-US" dirty="0"/>
+              <a:t>20 minutes</a:t>
+            </a:r>
+          </a:p>
+        </p:txBody>
+      </p:sp>
+      <p:sp>
+        <p:nvSpPr>
+          <p:cNvPr id="4" name="Slide Number Placeholder 3"/>
+          <p:cNvSpPr>
+            <a:spLocks noGrp="1"/>
+          </p:cNvSpPr>
+          <p:nvPr>
+            <p:ph type="sldNum" sz="quarter" idx="5"/>
+          </p:nvPr>
+        </p:nvSpPr>
+        <p:spPr/>
+        <p:txBody>
+          <a:bodyPr/>
+          <a:lstStyle/>
+          <a:p>
+            <a:fld id="{23C4817C-9E78-494C-A089-F217C38E8593}" type="slidenum">
+              <a:rPr lang="en-US" smtClean="0"/>
+              <a:t>40</a:t>
+            </a:fld>
+            <a:endParaRPr lang="en-US"/>
+          </a:p>
+        </p:txBody>
+      </p:sp>
+    </p:spTree>
+    <p:extLst>
+      <p:ext uri="{BB962C8B-B14F-4D97-AF65-F5344CB8AC3E}">
+        <p14:creationId xmlns:p14="http://schemas.microsoft.com/office/powerpoint/2010/main" val="3797594411"/>
+      </p:ext>
+    </p:extLst>
+  </p:cSld>
+  <p:clrMapOvr>
+    <a:masterClrMapping/>
+  </p:clrMapOvr>
+</p:notes>
+</file>
+
+<file path=ppt/notesSlides/notesSlide12.xml><?xml version="1.0" encoding="utf-8"?>
+<p:notes xmlns:a="http://schemas.openxmlformats.org/drawingml/2006/main" xmlns:r="http://schemas.openxmlformats.org/officeDocument/2006/relationships" xmlns:p="http://schemas.openxmlformats.org/presentationml/2006/main">
+  <p:cSld>
+    <p:spTree>
+      <p:nvGrpSpPr>
+        <p:cNvPr id="1" name=""/>
+        <p:cNvGrpSpPr/>
+        <p:nvPr/>
+      </p:nvGrpSpPr>
+      <p:grpSpPr>
+        <a:xfrm>
+          <a:off x="0" y="0"/>
+          <a:ext cx="0" cy="0"/>
+          <a:chOff x="0" y="0"/>
+          <a:chExt cx="0" cy="0"/>
+        </a:xfrm>
+      </p:grpSpPr>
+      <p:sp>
+        <p:nvSpPr>
+          <p:cNvPr id="2" name="Slide Image Placeholder 1"/>
+          <p:cNvSpPr>
+            <a:spLocks noGrp="1" noRot="1" noChangeAspect="1"/>
+          </p:cNvSpPr>
+          <p:nvPr>
+            <p:ph type="sldImg"/>
+          </p:nvPr>
+        </p:nvSpPr>
+        <p:spPr/>
+      </p:sp>
+      <p:sp>
+        <p:nvSpPr>
+          <p:cNvPr id="3" name="Notes Placeholder 2"/>
+          <p:cNvSpPr>
+            <a:spLocks noGrp="1"/>
+          </p:cNvSpPr>
+          <p:nvPr>
+            <p:ph type="body" idx="1"/>
+          </p:nvPr>
+        </p:nvSpPr>
+        <p:spPr/>
+        <p:txBody>
+          <a:bodyPr/>
+          <a:lstStyle/>
+          <a:p>
+            <a:r>
+              <a:rPr lang="en-US" dirty="0"/>
+              <a:t>10 minutes</a:t>
+            </a:r>
+          </a:p>
+        </p:txBody>
+      </p:sp>
+      <p:sp>
+        <p:nvSpPr>
+          <p:cNvPr id="4" name="Slide Number Placeholder 3"/>
+          <p:cNvSpPr>
+            <a:spLocks noGrp="1"/>
+          </p:cNvSpPr>
+          <p:nvPr>
+            <p:ph type="sldNum" sz="quarter" idx="5"/>
+          </p:nvPr>
+        </p:nvSpPr>
+        <p:spPr/>
+        <p:txBody>
+          <a:bodyPr/>
+          <a:lstStyle/>
+          <a:p>
+            <a:fld id="{23C4817C-9E78-494C-A089-F217C38E8593}" type="slidenum">
+              <a:rPr lang="en-US" smtClean="0"/>
+              <a:t>45</a:t>
+            </a:fld>
+            <a:endParaRPr lang="en-US"/>
+          </a:p>
+        </p:txBody>
+      </p:sp>
+    </p:spTree>
+    <p:extLst>
+      <p:ext uri="{BB962C8B-B14F-4D97-AF65-F5344CB8AC3E}">
+        <p14:creationId xmlns:p14="http://schemas.microsoft.com/office/powerpoint/2010/main" val="984683125"/>
       </p:ext>
     </p:extLst>
   </p:cSld>
@@ -16153,8 +16434,50 @@
           <a:p>
             <a:r>
               <a:rPr lang="en-US" dirty="0"/>
-              <a:t>Control group should be as similar as possible to experimental group in every way other than the independent variable being tested</a:t>
+              <a:t>Helpful: https://</a:t>
             </a:r>
+            <a:r>
+              <a:rPr lang="en-US" dirty="0" err="1"/>
+              <a:t>typeset.io</a:t>
+            </a:r>
+            <a:r>
+              <a:rPr lang="en-US" dirty="0"/>
+              <a:t>/questions/what-are-the-advantages-and-disadvantages-of-each-post-hoc-2y0f3tm72p</a:t>
+            </a:r>
+          </a:p>
+          <a:p>
+            <a:pPr marL="0" marR="0" lvl="0" indent="0" algn="l" defTabSz="914400" rtl="0" eaLnBrk="1" fontAlgn="auto" latinLnBrk="0" hangingPunct="1">
+              <a:lnSpc>
+                <a:spcPct val="100000"/>
+              </a:lnSpc>
+              <a:spcBef>
+                <a:spcPts val="0"/>
+              </a:spcBef>
+              <a:spcAft>
+                <a:spcPts val="0"/>
+              </a:spcAft>
+              <a:buClrTx/>
+              <a:buSzTx/>
+              <a:buFontTx/>
+              <a:buNone/>
+              <a:tabLst/>
+              <a:defRPr/>
+            </a:pPr>
+            <a:r>
+              <a:rPr lang="en-US" dirty="0"/>
+              <a:t>Refer to https://</a:t>
+            </a:r>
+            <a:r>
+              <a:rPr lang="en-US" dirty="0" err="1"/>
+              <a:t>eric.ed.gov</a:t>
+            </a:r>
+            <a:r>
+              <a:rPr lang="en-US" dirty="0"/>
+              <a:t>/?id=ED364597 for a demonstration of advantages of planned comparisons</a:t>
+            </a:r>
+          </a:p>
+          <a:p>
+            <a:endParaRPr lang="en-US" dirty="0"/>
           </a:p>
         </p:txBody>
       </p:sp>
@@ -16175,7 +16498,7 @@
           <a:p>
             <a:fld id="{23C4817C-9E78-494C-A089-F217C38E8593}" type="slidenum">
               <a:rPr lang="en-US" smtClean="0"/>
-              <a:t>10</a:t>
+              <a:t>6</a:t>
             </a:fld>
             <a:endParaRPr lang="en-US"/>
           </a:p>
@@ -16184,7 +16507,7 @@
     </p:spTree>
     <p:extLst>
       <p:ext uri="{BB962C8B-B14F-4D97-AF65-F5344CB8AC3E}">
-        <p14:creationId xmlns:p14="http://schemas.microsoft.com/office/powerpoint/2010/main" val="1693645493"/>
+        <p14:creationId xmlns:p14="http://schemas.microsoft.com/office/powerpoint/2010/main" val="3897303939"/>
       </p:ext>
     </p:extLst>
   </p:cSld>
@@ -16240,15 +16563,7 @@
           <a:p>
             <a:r>
               <a:rPr lang="en-US" dirty="0"/>
-              <a:t>Might switch to planned vs unplanned comparisons exercise based on: https://</a:t>
-            </a:r>
-            <a:r>
-              <a:rPr lang="en-US" dirty="0" err="1"/>
-              <a:t>eric.ed.gov</a:t>
-            </a:r>
-            <a:r>
-              <a:rPr lang="en-US" dirty="0"/>
-              <a:t>/?id=ED364597</a:t>
+              <a:t>My intent is to provide a practical overview, so I will not get into nitty gritty theory, derivations, or equations. See Works Cited and Further Reading if you want to know more!</a:t>
             </a:r>
           </a:p>
         </p:txBody>
@@ -16270,7 +16585,374 @@
           <a:p>
             <a:fld id="{23C4817C-9E78-494C-A089-F217C38E8593}" type="slidenum">
               <a:rPr lang="en-US" smtClean="0"/>
+              <a:t>7</a:t>
+            </a:fld>
+            <a:endParaRPr lang="en-US"/>
+          </a:p>
+        </p:txBody>
+      </p:sp>
+    </p:spTree>
+    <p:extLst>
+      <p:ext uri="{BB962C8B-B14F-4D97-AF65-F5344CB8AC3E}">
+        <p14:creationId xmlns:p14="http://schemas.microsoft.com/office/powerpoint/2010/main" val="512629544"/>
+      </p:ext>
+    </p:extLst>
+  </p:cSld>
+  <p:clrMapOvr>
+    <a:masterClrMapping/>
+  </p:clrMapOvr>
+</p:notes>
+</file>
+
+<file path=ppt/notesSlides/notesSlide4.xml><?xml version="1.0" encoding="utf-8"?>
+<p:notes xmlns:a="http://schemas.openxmlformats.org/drawingml/2006/main" xmlns:r="http://schemas.openxmlformats.org/officeDocument/2006/relationships" xmlns:p="http://schemas.openxmlformats.org/presentationml/2006/main">
+  <p:cSld>
+    <p:spTree>
+      <p:nvGrpSpPr>
+        <p:cNvPr id="1" name=""/>
+        <p:cNvGrpSpPr/>
+        <p:nvPr/>
+      </p:nvGrpSpPr>
+      <p:grpSpPr>
+        <a:xfrm>
+          <a:off x="0" y="0"/>
+          <a:ext cx="0" cy="0"/>
+          <a:chOff x="0" y="0"/>
+          <a:chExt cx="0" cy="0"/>
+        </a:xfrm>
+      </p:grpSpPr>
+      <p:sp>
+        <p:nvSpPr>
+          <p:cNvPr id="2" name="Slide Image Placeholder 1"/>
+          <p:cNvSpPr>
+            <a:spLocks noGrp="1" noRot="1" noChangeAspect="1"/>
+          </p:cNvSpPr>
+          <p:nvPr>
+            <p:ph type="sldImg"/>
+          </p:nvPr>
+        </p:nvSpPr>
+        <p:spPr/>
+      </p:sp>
+      <p:sp>
+        <p:nvSpPr>
+          <p:cNvPr id="3" name="Notes Placeholder 2"/>
+          <p:cNvSpPr>
+            <a:spLocks noGrp="1"/>
+          </p:cNvSpPr>
+          <p:nvPr>
+            <p:ph type="body" idx="1"/>
+          </p:nvPr>
+        </p:nvSpPr>
+        <p:spPr/>
+        <p:txBody>
+          <a:bodyPr/>
+          <a:lstStyle/>
+          <a:p>
+            <a:r>
+              <a:rPr lang="en-US" dirty="0"/>
+              <a:t>Control group should be as similar as possible to experimental group in every way other than the independent variable being tested</a:t>
+            </a:r>
+          </a:p>
+        </p:txBody>
+      </p:sp>
+      <p:sp>
+        <p:nvSpPr>
+          <p:cNvPr id="4" name="Slide Number Placeholder 3"/>
+          <p:cNvSpPr>
+            <a:spLocks noGrp="1"/>
+          </p:cNvSpPr>
+          <p:nvPr>
+            <p:ph type="sldNum" sz="quarter" idx="5"/>
+          </p:nvPr>
+        </p:nvSpPr>
+        <p:spPr/>
+        <p:txBody>
+          <a:bodyPr/>
+          <a:lstStyle/>
+          <a:p>
+            <a:fld id="{23C4817C-9E78-494C-A089-F217C38E8593}" type="slidenum">
+              <a:rPr lang="en-US" smtClean="0"/>
+              <a:t>10</a:t>
+            </a:fld>
+            <a:endParaRPr lang="en-US"/>
+          </a:p>
+        </p:txBody>
+      </p:sp>
+    </p:spTree>
+    <p:extLst>
+      <p:ext uri="{BB962C8B-B14F-4D97-AF65-F5344CB8AC3E}">
+        <p14:creationId xmlns:p14="http://schemas.microsoft.com/office/powerpoint/2010/main" val="1693645493"/>
+      </p:ext>
+    </p:extLst>
+  </p:cSld>
+  <p:clrMapOvr>
+    <a:masterClrMapping/>
+  </p:clrMapOvr>
+</p:notes>
+</file>
+
+<file path=ppt/notesSlides/notesSlide5.xml><?xml version="1.0" encoding="utf-8"?>
+<p:notes xmlns:a="http://schemas.openxmlformats.org/drawingml/2006/main" xmlns:r="http://schemas.openxmlformats.org/officeDocument/2006/relationships" xmlns:p="http://schemas.openxmlformats.org/presentationml/2006/main">
+  <p:cSld>
+    <p:spTree>
+      <p:nvGrpSpPr>
+        <p:cNvPr id="1" name=""/>
+        <p:cNvGrpSpPr/>
+        <p:nvPr/>
+      </p:nvGrpSpPr>
+      <p:grpSpPr>
+        <a:xfrm>
+          <a:off x="0" y="0"/>
+          <a:ext cx="0" cy="0"/>
+          <a:chOff x="0" y="0"/>
+          <a:chExt cx="0" cy="0"/>
+        </a:xfrm>
+      </p:grpSpPr>
+      <p:sp>
+        <p:nvSpPr>
+          <p:cNvPr id="2" name="Slide Image Placeholder 1"/>
+          <p:cNvSpPr>
+            <a:spLocks noGrp="1" noRot="1" noChangeAspect="1"/>
+          </p:cNvSpPr>
+          <p:nvPr>
+            <p:ph type="sldImg"/>
+          </p:nvPr>
+        </p:nvSpPr>
+        <p:spPr/>
+      </p:sp>
+      <p:sp>
+        <p:nvSpPr>
+          <p:cNvPr id="3" name="Notes Placeholder 2"/>
+          <p:cNvSpPr>
+            <a:spLocks noGrp="1"/>
+          </p:cNvSpPr>
+          <p:nvPr>
+            <p:ph type="body" idx="1"/>
+          </p:nvPr>
+        </p:nvSpPr>
+        <p:spPr/>
+        <p:txBody>
+          <a:bodyPr/>
+          <a:lstStyle/>
+          <a:p>
+            <a:r>
+              <a:rPr lang="en-US" dirty="0"/>
+              <a:t>Cover sample size, then elude to power analysis/effect size and note we’ll talk about it later in the workshop.</a:t>
+            </a:r>
+          </a:p>
+        </p:txBody>
+      </p:sp>
+      <p:sp>
+        <p:nvSpPr>
+          <p:cNvPr id="4" name="Slide Number Placeholder 3"/>
+          <p:cNvSpPr>
+            <a:spLocks noGrp="1"/>
+          </p:cNvSpPr>
+          <p:nvPr>
+            <p:ph type="sldNum" sz="quarter" idx="5"/>
+          </p:nvPr>
+        </p:nvSpPr>
+        <p:spPr/>
+        <p:txBody>
+          <a:bodyPr/>
+          <a:lstStyle/>
+          <a:p>
+            <a:fld id="{23C4817C-9E78-494C-A089-F217C38E8593}" type="slidenum">
+              <a:rPr lang="en-US" smtClean="0"/>
+              <a:t>13</a:t>
+            </a:fld>
+            <a:endParaRPr lang="en-US"/>
+          </a:p>
+        </p:txBody>
+      </p:sp>
+    </p:spTree>
+    <p:extLst>
+      <p:ext uri="{BB962C8B-B14F-4D97-AF65-F5344CB8AC3E}">
+        <p14:creationId xmlns:p14="http://schemas.microsoft.com/office/powerpoint/2010/main" val="3045838202"/>
+      </p:ext>
+    </p:extLst>
+  </p:cSld>
+  <p:clrMapOvr>
+    <a:masterClrMapping/>
+  </p:clrMapOvr>
+</p:notes>
+</file>
+
+<file path=ppt/notesSlides/notesSlide6.xml><?xml version="1.0" encoding="utf-8"?>
+<p:notes xmlns:a="http://schemas.openxmlformats.org/drawingml/2006/main" xmlns:r="http://schemas.openxmlformats.org/officeDocument/2006/relationships" xmlns:p="http://schemas.openxmlformats.org/presentationml/2006/main">
+  <p:cSld>
+    <p:spTree>
+      <p:nvGrpSpPr>
+        <p:cNvPr id="1" name=""/>
+        <p:cNvGrpSpPr/>
+        <p:nvPr/>
+      </p:nvGrpSpPr>
+      <p:grpSpPr>
+        <a:xfrm>
+          <a:off x="0" y="0"/>
+          <a:ext cx="0" cy="0"/>
+          <a:chOff x="0" y="0"/>
+          <a:chExt cx="0" cy="0"/>
+        </a:xfrm>
+      </p:grpSpPr>
+      <p:sp>
+        <p:nvSpPr>
+          <p:cNvPr id="2" name="Slide Image Placeholder 1"/>
+          <p:cNvSpPr>
+            <a:spLocks noGrp="1" noRot="1" noChangeAspect="1"/>
+          </p:cNvSpPr>
+          <p:nvPr>
+            <p:ph type="sldImg"/>
+          </p:nvPr>
+        </p:nvSpPr>
+        <p:spPr/>
+      </p:sp>
+      <p:sp>
+        <p:nvSpPr>
+          <p:cNvPr id="3" name="Notes Placeholder 2"/>
+          <p:cNvSpPr>
+            <a:spLocks noGrp="1"/>
+          </p:cNvSpPr>
+          <p:nvPr>
+            <p:ph type="body" idx="1"/>
+          </p:nvPr>
+        </p:nvSpPr>
+        <p:spPr/>
+        <p:txBody>
+          <a:bodyPr/>
+          <a:lstStyle/>
+          <a:p>
+            <a:r>
+              <a:rPr lang="en-US" dirty="0"/>
+              <a:t>May want to move this after statistical methods section?? After we talk about null hypotheses and each of these tests?</a:t>
+            </a:r>
+          </a:p>
+          <a:p>
+            <a:r>
+              <a:rPr lang="en-US" dirty="0"/>
+              <a:t>Helpful: https://</a:t>
+            </a:r>
+            <a:r>
+              <a:rPr lang="en-US" dirty="0" err="1"/>
+              <a:t>www.bioinformatics.babraham.ac.uk</a:t>
+            </a:r>
+            <a:r>
+              <a:rPr lang="en-US" dirty="0"/>
+              <a:t>/training/</a:t>
+            </a:r>
+            <a:r>
+              <a:rPr lang="en-US" dirty="0" err="1"/>
+              <a:t>R_Statistics</a:t>
+            </a:r>
+            <a:r>
+              <a:rPr lang="en-US" dirty="0"/>
+              <a:t>/Power%20Analysis%20with%20R.pdf</a:t>
+            </a:r>
+          </a:p>
+        </p:txBody>
+      </p:sp>
+      <p:sp>
+        <p:nvSpPr>
+          <p:cNvPr id="4" name="Slide Number Placeholder 3"/>
+          <p:cNvSpPr>
+            <a:spLocks noGrp="1"/>
+          </p:cNvSpPr>
+          <p:nvPr>
+            <p:ph type="sldNum" sz="quarter" idx="5"/>
+          </p:nvPr>
+        </p:nvSpPr>
+        <p:spPr/>
+        <p:txBody>
+          <a:bodyPr/>
+          <a:lstStyle/>
+          <a:p>
+            <a:fld id="{23C4817C-9E78-494C-A089-F217C38E8593}" type="slidenum">
+              <a:rPr lang="en-US" smtClean="0"/>
               <a:t>14</a:t>
+            </a:fld>
+            <a:endParaRPr lang="en-US"/>
+          </a:p>
+        </p:txBody>
+      </p:sp>
+    </p:spTree>
+    <p:extLst>
+      <p:ext uri="{BB962C8B-B14F-4D97-AF65-F5344CB8AC3E}">
+        <p14:creationId xmlns:p14="http://schemas.microsoft.com/office/powerpoint/2010/main" val="1325691958"/>
+      </p:ext>
+    </p:extLst>
+  </p:cSld>
+  <p:clrMapOvr>
+    <a:masterClrMapping/>
+  </p:clrMapOvr>
+</p:notes>
+</file>
+
+<file path=ppt/notesSlides/notesSlide7.xml><?xml version="1.0" encoding="utf-8"?>
+<p:notes xmlns:a="http://schemas.openxmlformats.org/drawingml/2006/main" xmlns:r="http://schemas.openxmlformats.org/officeDocument/2006/relationships" xmlns:p="http://schemas.openxmlformats.org/presentationml/2006/main">
+  <p:cSld>
+    <p:spTree>
+      <p:nvGrpSpPr>
+        <p:cNvPr id="1" name=""/>
+        <p:cNvGrpSpPr/>
+        <p:nvPr/>
+      </p:nvGrpSpPr>
+      <p:grpSpPr>
+        <a:xfrm>
+          <a:off x="0" y="0"/>
+          <a:ext cx="0" cy="0"/>
+          <a:chOff x="0" y="0"/>
+          <a:chExt cx="0" cy="0"/>
+        </a:xfrm>
+      </p:grpSpPr>
+      <p:sp>
+        <p:nvSpPr>
+          <p:cNvPr id="2" name="Slide Image Placeholder 1"/>
+          <p:cNvSpPr>
+            <a:spLocks noGrp="1" noRot="1" noChangeAspect="1"/>
+          </p:cNvSpPr>
+          <p:nvPr>
+            <p:ph type="sldImg"/>
+          </p:nvPr>
+        </p:nvSpPr>
+        <p:spPr/>
+      </p:sp>
+      <p:sp>
+        <p:nvSpPr>
+          <p:cNvPr id="3" name="Notes Placeholder 2"/>
+          <p:cNvSpPr>
+            <a:spLocks noGrp="1"/>
+          </p:cNvSpPr>
+          <p:nvPr>
+            <p:ph type="body" idx="1"/>
+          </p:nvPr>
+        </p:nvSpPr>
+        <p:spPr/>
+        <p:txBody>
+          <a:bodyPr/>
+          <a:lstStyle/>
+          <a:p>
+            <a:endParaRPr lang="en-US" dirty="0"/>
+          </a:p>
+        </p:txBody>
+      </p:sp>
+      <p:sp>
+        <p:nvSpPr>
+          <p:cNvPr id="4" name="Slide Number Placeholder 3"/>
+          <p:cNvSpPr>
+            <a:spLocks noGrp="1"/>
+          </p:cNvSpPr>
+          <p:nvPr>
+            <p:ph type="sldNum" sz="quarter" idx="5"/>
+          </p:nvPr>
+        </p:nvSpPr>
+        <p:spPr/>
+        <p:txBody>
+          <a:bodyPr/>
+          <a:lstStyle/>
+          <a:p>
+            <a:fld id="{23C4817C-9E78-494C-A089-F217C38E8593}" type="slidenum">
+              <a:rPr lang="en-US" smtClean="0"/>
+              <a:t>15</a:t>
             </a:fld>
             <a:endParaRPr lang="en-US"/>
           </a:p>
@@ -16280,6 +16962,180 @@
     <p:extLst>
       <p:ext uri="{BB962C8B-B14F-4D97-AF65-F5344CB8AC3E}">
         <p14:creationId xmlns:p14="http://schemas.microsoft.com/office/powerpoint/2010/main" val="3334281196"/>
+      </p:ext>
+    </p:extLst>
+  </p:cSld>
+  <p:clrMapOvr>
+    <a:masterClrMapping/>
+  </p:clrMapOvr>
+</p:notes>
+</file>
+
+<file path=ppt/notesSlides/notesSlide8.xml><?xml version="1.0" encoding="utf-8"?>
+<p:notes xmlns:a="http://schemas.openxmlformats.org/drawingml/2006/main" xmlns:r="http://schemas.openxmlformats.org/officeDocument/2006/relationships" xmlns:p="http://schemas.openxmlformats.org/presentationml/2006/main">
+  <p:cSld>
+    <p:spTree>
+      <p:nvGrpSpPr>
+        <p:cNvPr id="1" name=""/>
+        <p:cNvGrpSpPr/>
+        <p:nvPr/>
+      </p:nvGrpSpPr>
+      <p:grpSpPr>
+        <a:xfrm>
+          <a:off x="0" y="0"/>
+          <a:ext cx="0" cy="0"/>
+          <a:chOff x="0" y="0"/>
+          <a:chExt cx="0" cy="0"/>
+        </a:xfrm>
+      </p:grpSpPr>
+      <p:sp>
+        <p:nvSpPr>
+          <p:cNvPr id="2" name="Slide Image Placeholder 1"/>
+          <p:cNvSpPr>
+            <a:spLocks noGrp="1" noRot="1" noChangeAspect="1"/>
+          </p:cNvSpPr>
+          <p:nvPr>
+            <p:ph type="sldImg"/>
+          </p:nvPr>
+        </p:nvSpPr>
+        <p:spPr/>
+      </p:sp>
+      <p:sp>
+        <p:nvSpPr>
+          <p:cNvPr id="3" name="Notes Placeholder 2"/>
+          <p:cNvSpPr>
+            <a:spLocks noGrp="1"/>
+          </p:cNvSpPr>
+          <p:nvPr>
+            <p:ph type="body" idx="1"/>
+          </p:nvPr>
+        </p:nvSpPr>
+        <p:spPr/>
+        <p:txBody>
+          <a:bodyPr/>
+          <a:lstStyle/>
+          <a:p>
+            <a:r>
+              <a:rPr lang="en-US" dirty="0"/>
+              <a:t>10 minutes</a:t>
+            </a:r>
+          </a:p>
+        </p:txBody>
+      </p:sp>
+      <p:sp>
+        <p:nvSpPr>
+          <p:cNvPr id="4" name="Slide Number Placeholder 3"/>
+          <p:cNvSpPr>
+            <a:spLocks noGrp="1"/>
+          </p:cNvSpPr>
+          <p:nvPr>
+            <p:ph type="sldNum" sz="quarter" idx="5"/>
+          </p:nvPr>
+        </p:nvSpPr>
+        <p:spPr/>
+        <p:txBody>
+          <a:bodyPr/>
+          <a:lstStyle/>
+          <a:p>
+            <a:fld id="{23C4817C-9E78-494C-A089-F217C38E8593}" type="slidenum">
+              <a:rPr lang="en-US" smtClean="0"/>
+              <a:t>16</a:t>
+            </a:fld>
+            <a:endParaRPr lang="en-US"/>
+          </a:p>
+        </p:txBody>
+      </p:sp>
+    </p:spTree>
+    <p:extLst>
+      <p:ext uri="{BB962C8B-B14F-4D97-AF65-F5344CB8AC3E}">
+        <p14:creationId xmlns:p14="http://schemas.microsoft.com/office/powerpoint/2010/main" val="8328238"/>
+      </p:ext>
+    </p:extLst>
+  </p:cSld>
+  <p:clrMapOvr>
+    <a:masterClrMapping/>
+  </p:clrMapOvr>
+</p:notes>
+</file>
+
+<file path=ppt/notesSlides/notesSlide9.xml><?xml version="1.0" encoding="utf-8"?>
+<p:notes xmlns:a="http://schemas.openxmlformats.org/drawingml/2006/main" xmlns:r="http://schemas.openxmlformats.org/officeDocument/2006/relationships" xmlns:p="http://schemas.openxmlformats.org/presentationml/2006/main">
+  <p:cSld>
+    <p:spTree>
+      <p:nvGrpSpPr>
+        <p:cNvPr id="1" name=""/>
+        <p:cNvGrpSpPr/>
+        <p:nvPr/>
+      </p:nvGrpSpPr>
+      <p:grpSpPr>
+        <a:xfrm>
+          <a:off x="0" y="0"/>
+          <a:ext cx="0" cy="0"/>
+          <a:chOff x="0" y="0"/>
+          <a:chExt cx="0" cy="0"/>
+        </a:xfrm>
+      </p:grpSpPr>
+      <p:sp>
+        <p:nvSpPr>
+          <p:cNvPr id="2" name="Slide Image Placeholder 1"/>
+          <p:cNvSpPr>
+            <a:spLocks noGrp="1" noRot="1" noChangeAspect="1"/>
+          </p:cNvSpPr>
+          <p:nvPr>
+            <p:ph type="sldImg"/>
+          </p:nvPr>
+        </p:nvSpPr>
+        <p:spPr/>
+      </p:sp>
+      <p:sp>
+        <p:nvSpPr>
+          <p:cNvPr id="3" name="Notes Placeholder 2"/>
+          <p:cNvSpPr>
+            <a:spLocks noGrp="1"/>
+          </p:cNvSpPr>
+          <p:nvPr>
+            <p:ph type="body" idx="1"/>
+          </p:nvPr>
+        </p:nvSpPr>
+        <p:spPr/>
+        <p:txBody>
+          <a:bodyPr/>
+          <a:lstStyle/>
+          <a:p>
+            <a:r>
+              <a:rPr lang="en-US" dirty="0"/>
+              <a:t>Quick: 5 minutes tops</a:t>
+            </a:r>
+          </a:p>
+        </p:txBody>
+      </p:sp>
+      <p:sp>
+        <p:nvSpPr>
+          <p:cNvPr id="4" name="Slide Number Placeholder 3"/>
+          <p:cNvSpPr>
+            <a:spLocks noGrp="1"/>
+          </p:cNvSpPr>
+          <p:nvPr>
+            <p:ph type="sldNum" sz="quarter" idx="5"/>
+          </p:nvPr>
+        </p:nvSpPr>
+        <p:spPr/>
+        <p:txBody>
+          <a:bodyPr/>
+          <a:lstStyle/>
+          <a:p>
+            <a:fld id="{23C4817C-9E78-494C-A089-F217C38E8593}" type="slidenum">
+              <a:rPr lang="en-US" smtClean="0"/>
+              <a:t>20</a:t>
+            </a:fld>
+            <a:endParaRPr lang="en-US"/>
+          </a:p>
+        </p:txBody>
+      </p:sp>
+    </p:spTree>
+    <p:extLst>
+      <p:ext uri="{BB962C8B-B14F-4D97-AF65-F5344CB8AC3E}">
+        <p14:creationId xmlns:p14="http://schemas.microsoft.com/office/powerpoint/2010/main" val="4147824291"/>
       </p:ext>
     </p:extLst>
   </p:cSld>
@@ -16452,7 +17308,7 @@
           <a:p>
             <a:fld id="{ED88B68D-D1BA-DE49-8C6A-CBCEE2F00303}" type="datetimeFigureOut">
               <a:rPr lang="en-US" smtClean="0"/>
-              <a:t>3/13/24</a:t>
+              <a:t>3/14/24</a:t>
             </a:fld>
             <a:endParaRPr lang="en-US"/>
           </a:p>
@@ -16622,7 +17478,7 @@
           <a:p>
             <a:fld id="{ED88B68D-D1BA-DE49-8C6A-CBCEE2F00303}" type="datetimeFigureOut">
               <a:rPr lang="en-US" smtClean="0"/>
-              <a:t>3/13/24</a:t>
+              <a:t>3/14/24</a:t>
             </a:fld>
             <a:endParaRPr lang="en-US"/>
           </a:p>
@@ -16802,7 +17658,7 @@
           <a:p>
             <a:fld id="{ED88B68D-D1BA-DE49-8C6A-CBCEE2F00303}" type="datetimeFigureOut">
               <a:rPr lang="en-US" smtClean="0"/>
-              <a:t>3/13/24</a:t>
+              <a:t>3/14/24</a:t>
             </a:fld>
             <a:endParaRPr lang="en-US"/>
           </a:p>
@@ -16972,7 +17828,7 @@
           <a:p>
             <a:fld id="{ED88B68D-D1BA-DE49-8C6A-CBCEE2F00303}" type="datetimeFigureOut">
               <a:rPr lang="en-US" smtClean="0"/>
-              <a:t>3/13/24</a:t>
+              <a:t>3/14/24</a:t>
             </a:fld>
             <a:endParaRPr lang="en-US"/>
           </a:p>
@@ -17240,7 +18096,7 @@
           <a:p>
             <a:fld id="{ED88B68D-D1BA-DE49-8C6A-CBCEE2F00303}" type="datetimeFigureOut">
               <a:rPr lang="en-US" smtClean="0"/>
-              <a:t>3/13/24</a:t>
+              <a:t>3/14/24</a:t>
             </a:fld>
             <a:endParaRPr lang="en-US"/>
           </a:p>
@@ -17472,7 +18328,7 @@
           <a:p>
             <a:fld id="{ED88B68D-D1BA-DE49-8C6A-CBCEE2F00303}" type="datetimeFigureOut">
               <a:rPr lang="en-US" smtClean="0"/>
-              <a:t>3/13/24</a:t>
+              <a:t>3/14/24</a:t>
             </a:fld>
             <a:endParaRPr lang="en-US"/>
           </a:p>
@@ -17831,7 +18687,7 @@
           <a:p>
             <a:fld id="{ED88B68D-D1BA-DE49-8C6A-CBCEE2F00303}" type="datetimeFigureOut">
               <a:rPr lang="en-US" smtClean="0"/>
-              <a:t>3/13/24</a:t>
+              <a:t>3/14/24</a:t>
             </a:fld>
             <a:endParaRPr lang="en-US"/>
           </a:p>
@@ -17972,7 +18828,7 @@
           <a:p>
             <a:fld id="{ED88B68D-D1BA-DE49-8C6A-CBCEE2F00303}" type="datetimeFigureOut">
               <a:rPr lang="en-US" smtClean="0"/>
-              <a:t>3/13/24</a:t>
+              <a:t>3/14/24</a:t>
             </a:fld>
             <a:endParaRPr lang="en-US"/>
           </a:p>
@@ -18067,7 +18923,7 @@
           <a:p>
             <a:fld id="{ED88B68D-D1BA-DE49-8C6A-CBCEE2F00303}" type="datetimeFigureOut">
               <a:rPr lang="en-US" smtClean="0"/>
-              <a:t>3/13/24</a:t>
+              <a:t>3/14/24</a:t>
             </a:fld>
             <a:endParaRPr lang="en-US"/>
           </a:p>
@@ -18424,7 +19280,7 @@
           <a:p>
             <a:fld id="{ED88B68D-D1BA-DE49-8C6A-CBCEE2F00303}" type="datetimeFigureOut">
               <a:rPr lang="en-US" smtClean="0"/>
-              <a:t>3/13/24</a:t>
+              <a:t>3/14/24</a:t>
             </a:fld>
             <a:endParaRPr lang="en-US"/>
           </a:p>
@@ -18781,7 +19637,7 @@
           <a:p>
             <a:fld id="{ED88B68D-D1BA-DE49-8C6A-CBCEE2F00303}" type="datetimeFigureOut">
               <a:rPr lang="en-US" smtClean="0"/>
-              <a:t>3/13/24</a:t>
+              <a:t>3/14/24</a:t>
             </a:fld>
             <a:endParaRPr lang="en-US"/>
           </a:p>
@@ -19023,7 +19879,7 @@
           <a:p>
             <a:fld id="{ED88B68D-D1BA-DE49-8C6A-CBCEE2F00303}" type="datetimeFigureOut">
               <a:rPr lang="en-US" smtClean="0"/>
-              <a:t>3/13/24</a:t>
+              <a:t>3/14/24</a:t>
             </a:fld>
             <a:endParaRPr lang="en-US"/>
           </a:p>
@@ -19993,6 +20849,89 @@
           <p:cNvPr id="2" name="Title 1">
             <a:extLst>
               <a:ext uri="{FF2B5EF4-FFF2-40B4-BE49-F238E27FC236}">
+                <a16:creationId xmlns:a16="http://schemas.microsoft.com/office/drawing/2014/main" id="{663CFB5D-A5B6-01D9-3E26-2105F2C92BA9}"/>
+              </a:ext>
+            </a:extLst>
+          </p:cNvPr>
+          <p:cNvSpPr>
+            <a:spLocks noGrp="1"/>
+          </p:cNvSpPr>
+          <p:nvPr>
+            <p:ph type="title"/>
+          </p:nvPr>
+        </p:nvSpPr>
+        <p:spPr/>
+        <p:txBody>
+          <a:bodyPr/>
+          <a:lstStyle/>
+          <a:p>
+            <a:r>
+              <a:rPr lang="en-US" dirty="0"/>
+              <a:t>Sample Size</a:t>
+            </a:r>
+          </a:p>
+        </p:txBody>
+      </p:sp>
+      <p:sp>
+        <p:nvSpPr>
+          <p:cNvPr id="3" name="Content Placeholder 2">
+            <a:extLst>
+              <a:ext uri="{FF2B5EF4-FFF2-40B4-BE49-F238E27FC236}">
+                <a16:creationId xmlns:a16="http://schemas.microsoft.com/office/drawing/2014/main" id="{700D0D9F-AB08-1080-E02A-33EE62E6FA43}"/>
+              </a:ext>
+            </a:extLst>
+          </p:cNvPr>
+          <p:cNvSpPr>
+            <a:spLocks noGrp="1"/>
+          </p:cNvSpPr>
+          <p:nvPr>
+            <p:ph idx="1"/>
+          </p:nvPr>
+        </p:nvSpPr>
+        <p:spPr/>
+        <p:txBody>
+          <a:bodyPr/>
+          <a:lstStyle/>
+          <a:p>
+            <a:endParaRPr lang="en-US"/>
+          </a:p>
+        </p:txBody>
+      </p:sp>
+    </p:spTree>
+    <p:extLst>
+      <p:ext uri="{BB962C8B-B14F-4D97-AF65-F5344CB8AC3E}">
+        <p14:creationId xmlns:p14="http://schemas.microsoft.com/office/powerpoint/2010/main" val="2386160032"/>
+      </p:ext>
+    </p:extLst>
+  </p:cSld>
+  <p:clrMapOvr>
+    <a:masterClrMapping/>
+  </p:clrMapOvr>
+</p:sld>
+</file>
+
+<file path=ppt/slides/slide14.xml><?xml version="1.0" encoding="utf-8"?>
+<p:sld xmlns:a="http://schemas.openxmlformats.org/drawingml/2006/main" xmlns:r="http://schemas.openxmlformats.org/officeDocument/2006/relationships" xmlns:p="http://schemas.openxmlformats.org/presentationml/2006/main">
+  <p:cSld>
+    <p:spTree>
+      <p:nvGrpSpPr>
+        <p:cNvPr id="1" name=""/>
+        <p:cNvGrpSpPr/>
+        <p:nvPr/>
+      </p:nvGrpSpPr>
+      <p:grpSpPr>
+        <a:xfrm>
+          <a:off x="0" y="0"/>
+          <a:ext cx="0" cy="0"/>
+          <a:chOff x="0" y="0"/>
+          <a:chExt cx="0" cy="0"/>
+        </a:xfrm>
+      </p:grpSpPr>
+      <p:sp>
+        <p:nvSpPr>
+          <p:cNvPr id="2" name="Title 1">
+            <a:extLst>
+              <a:ext uri="{FF2B5EF4-FFF2-40B4-BE49-F238E27FC236}">
                 <a16:creationId xmlns:a16="http://schemas.microsoft.com/office/drawing/2014/main" id="{16206E96-7BCC-0785-AB43-18F30956D5A5}"/>
               </a:ext>
             </a:extLst>
@@ -20011,7 +20950,7 @@
           <a:p>
             <a:r>
               <a:rPr lang="en-US" dirty="0"/>
-              <a:t>Sample size &amp; Power Analysis</a:t>
+              <a:t>Power &amp; Effects size</a:t>
             </a:r>
           </a:p>
         </p:txBody>
@@ -20029,15 +20968,164 @@
             <a:spLocks noGrp="1"/>
           </p:cNvSpPr>
           <p:nvPr>
-            <p:ph idx="1"/>
+            <p:ph sz="half" idx="1"/>
           </p:nvPr>
         </p:nvSpPr>
         <p:spPr/>
         <p:txBody>
-          <a:bodyPr/>
+          <a:bodyPr>
+            <a:normAutofit/>
+          </a:bodyPr>
           <a:lstStyle/>
           <a:p>
-            <a:endParaRPr lang="en-US"/>
+            <a:r>
+              <a:rPr lang="en-US" b="1" dirty="0"/>
+              <a:t>Power</a:t>
+            </a:r>
+            <a:r>
+              <a:rPr lang="en-US" dirty="0"/>
+              <a:t> = the probability that a statistical test will reject a false null hypothesis</a:t>
+            </a:r>
+          </a:p>
+          <a:p>
+            <a:r>
+              <a:rPr lang="en-US" dirty="0"/>
+              <a:t>A larger sample size provides more power, meaning your statistical test is more likely to detect an effect.</a:t>
+            </a:r>
+          </a:p>
+        </p:txBody>
+      </p:sp>
+      <p:sp>
+        <p:nvSpPr>
+          <p:cNvPr id="4" name="Content Placeholder 3">
+            <a:extLst>
+              <a:ext uri="{FF2B5EF4-FFF2-40B4-BE49-F238E27FC236}">
+                <a16:creationId xmlns:a16="http://schemas.microsoft.com/office/drawing/2014/main" id="{F94A5CBF-9D6B-4F78-6602-61C4005F5E19}"/>
+              </a:ext>
+            </a:extLst>
+          </p:cNvPr>
+          <p:cNvSpPr>
+            <a:spLocks noGrp="1"/>
+          </p:cNvSpPr>
+          <p:nvPr>
+            <p:ph sz="half" idx="2"/>
+          </p:nvPr>
+        </p:nvSpPr>
+        <p:spPr/>
+        <p:txBody>
+          <a:bodyPr>
+            <a:normAutofit/>
+          </a:bodyPr>
+          <a:lstStyle/>
+          <a:p>
+            <a:r>
+              <a:rPr lang="en-US" b="1" dirty="0"/>
+              <a:t>Effect size </a:t>
+            </a:r>
+            <a:r>
+              <a:rPr lang="en-US" dirty="0"/>
+              <a:t>= the absolute difference between groups + variability</a:t>
+            </a:r>
+          </a:p>
+          <a:p>
+            <a:r>
+              <a:rPr lang="en-US" dirty="0"/>
+              <a:t>Cohen (1988) provides cutoffs for effects sizes as:</a:t>
+            </a:r>
+          </a:p>
+          <a:p>
+            <a:pPr lvl="1"/>
+            <a:r>
+              <a:rPr lang="en-US" sz="1800" b="0" i="0" dirty="0">
+                <a:solidFill>
+                  <a:srgbClr val="2B2B2B"/>
+                </a:solidFill>
+                <a:effectLst/>
+              </a:rPr>
+              <a:t>small </a:t>
+            </a:r>
+            <a:r>
+              <a:rPr lang="en-US" sz="1800" b="0" i="0" u="none" strike="noStrike" dirty="0">
+                <a:solidFill>
+                  <a:srgbClr val="2B2B2B"/>
+                </a:solidFill>
+                <a:effectLst/>
+              </a:rPr>
+              <a:t>≥</a:t>
+            </a:r>
+            <a:r>
+              <a:rPr lang="en-US" sz="1800" b="0" i="0" dirty="0">
+                <a:solidFill>
+                  <a:srgbClr val="2B2B2B"/>
+                </a:solidFill>
+                <a:effectLst/>
+              </a:rPr>
+              <a:t> 0.02, </a:t>
+            </a:r>
+          </a:p>
+          <a:p>
+            <a:pPr lvl="1"/>
+            <a:r>
+              <a:rPr lang="en-US" sz="1800" b="0" i="0" dirty="0">
+                <a:solidFill>
+                  <a:srgbClr val="2B2B2B"/>
+                </a:solidFill>
+                <a:effectLst/>
+              </a:rPr>
+              <a:t>medium </a:t>
+            </a:r>
+            <a:r>
+              <a:rPr lang="en-US" sz="1800" b="0" i="0" u="none" strike="noStrike" dirty="0">
+                <a:solidFill>
+                  <a:srgbClr val="2B2B2B"/>
+                </a:solidFill>
+                <a:effectLst/>
+              </a:rPr>
+              <a:t>≥</a:t>
+            </a:r>
+            <a:r>
+              <a:rPr lang="en-US" sz="1800" b="0" i="0" dirty="0">
+                <a:solidFill>
+                  <a:srgbClr val="2B2B2B"/>
+                </a:solidFill>
+                <a:effectLst/>
+              </a:rPr>
+              <a:t> 0.15</a:t>
+            </a:r>
+          </a:p>
+          <a:p>
+            <a:pPr lvl="1"/>
+            <a:r>
+              <a:rPr lang="en-US" sz="1800" b="0" i="0" dirty="0">
+                <a:solidFill>
+                  <a:srgbClr val="2B2B2B"/>
+                </a:solidFill>
+                <a:effectLst/>
+              </a:rPr>
+              <a:t>large </a:t>
+            </a:r>
+            <a:r>
+              <a:rPr lang="en-US" sz="1800" b="0" i="0" u="none" strike="noStrike" dirty="0">
+                <a:solidFill>
+                  <a:srgbClr val="2B2B2B"/>
+                </a:solidFill>
+                <a:effectLst/>
+              </a:rPr>
+              <a:t>≥</a:t>
+            </a:r>
+            <a:r>
+              <a:rPr lang="en-US" sz="1800" b="0" i="0" dirty="0">
+                <a:solidFill>
+                  <a:srgbClr val="2B2B2B"/>
+                </a:solidFill>
+                <a:effectLst/>
+              </a:rPr>
+              <a:t> 0.35</a:t>
+            </a:r>
+            <a:endParaRPr lang="en-US" sz="1800" dirty="0"/>
+          </a:p>
+          <a:p>
+            <a:endParaRPr lang="en-US" dirty="0"/>
           </a:p>
         </p:txBody>
       </p:sp>
@@ -20054,7 +21142,483 @@
 </p:sld>
 </file>
 
-<file path=ppt/slides/slide14.xml><?xml version="1.0" encoding="utf-8"?>
+<file path=ppt/slides/slide15.xml><?xml version="1.0" encoding="utf-8"?>
+<p:sld xmlns:a="http://schemas.openxmlformats.org/drawingml/2006/main" xmlns:r="http://schemas.openxmlformats.org/officeDocument/2006/relationships" xmlns:p="http://schemas.openxmlformats.org/presentationml/2006/main">
+  <p:cSld>
+    <p:bg>
+      <p:bgPr>
+        <a:solidFill>
+          <a:schemeClr val="bg1">
+            <a:lumMod val="95000"/>
+          </a:schemeClr>
+        </a:solidFill>
+        <a:effectLst/>
+      </p:bgPr>
+    </p:bg>
+    <p:spTree>
+      <p:nvGrpSpPr>
+        <p:cNvPr id="1" name=""/>
+        <p:cNvGrpSpPr/>
+        <p:nvPr/>
+      </p:nvGrpSpPr>
+      <p:grpSpPr>
+        <a:xfrm>
+          <a:off x="0" y="0"/>
+          <a:ext cx="0" cy="0"/>
+          <a:chOff x="0" y="0"/>
+          <a:chExt cx="0" cy="0"/>
+        </a:xfrm>
+      </p:grpSpPr>
+      <p:sp>
+        <p:nvSpPr>
+          <p:cNvPr id="2" name="Title 1">
+            <a:extLst>
+              <a:ext uri="{FF2B5EF4-FFF2-40B4-BE49-F238E27FC236}">
+                <a16:creationId xmlns:a16="http://schemas.microsoft.com/office/drawing/2014/main" id="{A795F7A3-737A-E408-0B94-57D0621A78C0}"/>
+              </a:ext>
+            </a:extLst>
+          </p:cNvPr>
+          <p:cNvSpPr>
+            <a:spLocks noGrp="1"/>
+          </p:cNvSpPr>
+          <p:nvPr>
+            <p:ph type="title"/>
+          </p:nvPr>
+        </p:nvSpPr>
+        <p:spPr>
+          <a:xfrm>
+            <a:off x="804671" y="964692"/>
+            <a:ext cx="5928637" cy="1188720"/>
+          </a:xfrm>
+        </p:spPr>
+        <p:txBody>
+          <a:bodyPr>
+            <a:normAutofit/>
+          </a:bodyPr>
+          <a:lstStyle/>
+          <a:p>
+            <a:r>
+              <a:rPr lang="en-US" dirty="0"/>
+              <a:t>Activity 1: Power Analysis in R</a:t>
+            </a:r>
+          </a:p>
+        </p:txBody>
+      </p:sp>
+      <p:sp>
+        <p:nvSpPr>
+          <p:cNvPr id="3" name="Content Placeholder 2">
+            <a:extLst>
+              <a:ext uri="{FF2B5EF4-FFF2-40B4-BE49-F238E27FC236}">
+                <a16:creationId xmlns:a16="http://schemas.microsoft.com/office/drawing/2014/main" id="{89384D73-49C2-5AE1-C3E9-5099BF61D483}"/>
+              </a:ext>
+            </a:extLst>
+          </p:cNvPr>
+          <p:cNvSpPr>
+            <a:spLocks noGrp="1"/>
+          </p:cNvSpPr>
+          <p:nvPr>
+            <p:ph idx="1"/>
+          </p:nvPr>
+        </p:nvSpPr>
+        <p:spPr>
+          <a:xfrm>
+            <a:off x="804672" y="2638044"/>
+            <a:ext cx="5925312" cy="3101983"/>
+          </a:xfrm>
+        </p:spPr>
+        <p:txBody>
+          <a:bodyPr>
+            <a:normAutofit lnSpcReduction="10000"/>
+          </a:bodyPr>
+          <a:lstStyle/>
+          <a:p>
+            <a:r>
+              <a:rPr lang="en-US" sz="2000" dirty="0"/>
+              <a:t>The ‘</a:t>
+            </a:r>
+            <a:r>
+              <a:rPr lang="en-US" sz="2000" dirty="0" err="1"/>
+              <a:t>pwr</a:t>
+            </a:r>
+            <a:r>
+              <a:rPr lang="en-US" sz="2000" dirty="0"/>
+              <a:t>’ package (</a:t>
+            </a:r>
+            <a:r>
+              <a:rPr lang="en-US" sz="2000" dirty="0" err="1"/>
+              <a:t>Champley</a:t>
+            </a:r>
+            <a:r>
+              <a:rPr lang="en-US" sz="2000" dirty="0"/>
+              <a:t> 2020) can perform power analyses for a variety of common statistical test.</a:t>
+            </a:r>
+          </a:p>
+          <a:p>
+            <a:r>
+              <a:rPr lang="en-US" sz="2000" dirty="0"/>
+              <a:t>E</a:t>
+            </a:r>
+            <a:r>
+              <a:rPr lang="en-US" sz="2000" b="0" i="0" dirty="0">
+                <a:effectLst/>
+              </a:rPr>
+              <a:t>nter three of the four parameters (effect size, sample size, significance level, power) as well as your number of groups and the fourth is calculated.</a:t>
+            </a:r>
+          </a:p>
+          <a:p>
+            <a:r>
+              <a:rPr lang="en-US" sz="2000" dirty="0"/>
+              <a:t>On the right is an example power analysis for ANOVA.</a:t>
+            </a:r>
+          </a:p>
+          <a:p>
+            <a:r>
+              <a:rPr lang="en-US" sz="2000" dirty="0"/>
+              <a:t>Note that </a:t>
+            </a:r>
+            <a:r>
+              <a:rPr lang="en-US" sz="2000" b="1" dirty="0"/>
+              <a:t>sample size is per group</a:t>
+            </a:r>
+            <a:r>
+              <a:rPr lang="en-US" sz="2000" dirty="0"/>
+              <a:t>!</a:t>
+            </a:r>
+          </a:p>
+        </p:txBody>
+      </p:sp>
+      <p:sp>
+        <p:nvSpPr>
+          <p:cNvPr id="12" name="Rectangle 11">
+            <a:extLst>
+              <a:ext uri="{FF2B5EF4-FFF2-40B4-BE49-F238E27FC236}">
+                <a16:creationId xmlns:a16="http://schemas.microsoft.com/office/drawing/2014/main" id="{E3BC0364-4B58-4841-A227-00A6A59E02C6}"/>
+              </a:ext>
+              <a:ext uri="{C183D7F6-B498-43B3-948B-1728B52AA6E4}">
+                <adec:decorative xmlns:adec="http://schemas.microsoft.com/office/drawing/2017/decorative" val="1"/>
+              </a:ext>
+            </a:extLst>
+          </p:cNvPr>
+          <p:cNvSpPr>
+            <a:spLocks noGrp="1" noRot="1" noChangeAspect="1" noMove="1" noResize="1" noEditPoints="1" noAdjustHandles="1" noChangeArrowheads="1" noChangeShapeType="1" noTextEdit="1"/>
+          </p:cNvSpPr>
+          <p:nvPr>
+            <p:extLst>
+              <p:ext uri="{386F3935-93C4-4BCD-93E2-E3B085C9AB24}">
+                <p16:designElem xmlns:p16="http://schemas.microsoft.com/office/powerpoint/2015/main" val="1"/>
+              </p:ext>
+            </p:extLst>
+          </p:nvPr>
+        </p:nvSpPr>
+        <p:spPr>
+          <a:xfrm>
+            <a:off x="7534656" y="-2"/>
+            <a:ext cx="4657344" cy="6858002"/>
+          </a:xfrm>
+          <a:prstGeom prst="rect">
+            <a:avLst/>
+          </a:prstGeom>
+          <a:solidFill>
+            <a:schemeClr val="accent2"/>
+          </a:solidFill>
+          <a:ln>
+            <a:noFill/>
+          </a:ln>
+        </p:spPr>
+        <p:style>
+          <a:lnRef idx="2">
+            <a:schemeClr val="accent1">
+              <a:shade val="50000"/>
+            </a:schemeClr>
+          </a:lnRef>
+          <a:fillRef idx="1">
+            <a:schemeClr val="accent1"/>
+          </a:fillRef>
+          <a:effectRef idx="0">
+            <a:schemeClr val="accent1"/>
+          </a:effectRef>
+          <a:fontRef idx="minor">
+            <a:schemeClr val="lt1"/>
+          </a:fontRef>
+        </p:style>
+        <p:txBody>
+          <a:bodyPr rtlCol="0" anchor="ctr"/>
+          <a:lstStyle/>
+          <a:p>
+            <a:pPr algn="ctr"/>
+            <a:endParaRPr lang="en-US"/>
+          </a:p>
+        </p:txBody>
+      </p:sp>
+      <p:sp>
+        <p:nvSpPr>
+          <p:cNvPr id="14" name="Rectangle 13">
+            <a:extLst>
+              <a:ext uri="{FF2B5EF4-FFF2-40B4-BE49-F238E27FC236}">
+                <a16:creationId xmlns:a16="http://schemas.microsoft.com/office/drawing/2014/main" id="{A029A1F4-D02D-48E4-9331-6870B23B4FAF}"/>
+              </a:ext>
+              <a:ext uri="{C183D7F6-B498-43B3-948B-1728B52AA6E4}">
+                <adec:decorative xmlns:adec="http://schemas.microsoft.com/office/drawing/2017/decorative" val="1"/>
+              </a:ext>
+            </a:extLst>
+          </p:cNvPr>
+          <p:cNvSpPr>
+            <a:spLocks noGrp="1" noRot="1" noChangeAspect="1" noMove="1" noResize="1" noEditPoints="1" noAdjustHandles="1" noChangeArrowheads="1" noChangeShapeType="1" noTextEdit="1"/>
+          </p:cNvSpPr>
+          <p:nvPr>
+            <p:extLst>
+              <p:ext uri="{386F3935-93C4-4BCD-93E2-E3B085C9AB24}">
+                <p16:designElem xmlns:p16="http://schemas.microsoft.com/office/powerpoint/2015/main" val="1"/>
+              </p:ext>
+            </p:extLst>
+          </p:nvPr>
+        </p:nvSpPr>
+        <p:spPr>
+          <a:xfrm>
+            <a:off x="8020813" y="479893"/>
+            <a:ext cx="3685031" cy="5458969"/>
+          </a:xfrm>
+          <a:prstGeom prst="rect">
+            <a:avLst/>
+          </a:prstGeom>
+          <a:noFill/>
+          <a:ln w="31750" cap="sq">
+            <a:solidFill>
+              <a:srgbClr val="FFFFFF"/>
+            </a:solidFill>
+            <a:miter lim="800000"/>
+          </a:ln>
+        </p:spPr>
+        <p:style>
+          <a:lnRef idx="2">
+            <a:schemeClr val="accent1">
+              <a:shade val="50000"/>
+            </a:schemeClr>
+          </a:lnRef>
+          <a:fillRef idx="1">
+            <a:schemeClr val="accent1"/>
+          </a:fillRef>
+          <a:effectRef idx="0">
+            <a:schemeClr val="accent1"/>
+          </a:effectRef>
+          <a:fontRef idx="minor">
+            <a:schemeClr val="lt1"/>
+          </a:fontRef>
+        </p:style>
+        <p:txBody>
+          <a:bodyPr rtlCol="0" anchor="ctr"/>
+          <a:lstStyle/>
+          <a:p>
+            <a:pPr algn="ctr"/>
+            <a:endParaRPr lang="en-US" dirty="0"/>
+          </a:p>
+        </p:txBody>
+      </p:sp>
+      <p:sp>
+        <p:nvSpPr>
+          <p:cNvPr id="16" name="Rectangle 15">
+            <a:extLst>
+              <a:ext uri="{FF2B5EF4-FFF2-40B4-BE49-F238E27FC236}">
+                <a16:creationId xmlns:a16="http://schemas.microsoft.com/office/drawing/2014/main" id="{D06A8CF3-711E-4C63-9DD5-53A2696C0D6F}"/>
+              </a:ext>
+              <a:ext uri="{C183D7F6-B498-43B3-948B-1728B52AA6E4}">
+                <adec:decorative xmlns:adec="http://schemas.microsoft.com/office/drawing/2017/decorative" val="1"/>
+              </a:ext>
+            </a:extLst>
+          </p:cNvPr>
+          <p:cNvSpPr>
+            <a:spLocks noGrp="1" noRot="1" noChangeAspect="1" noMove="1" noResize="1" noEditPoints="1" noAdjustHandles="1" noChangeArrowheads="1" noChangeShapeType="1" noTextEdit="1"/>
+          </p:cNvSpPr>
+          <p:nvPr>
+            <p:extLst>
+              <p:ext uri="{386F3935-93C4-4BCD-93E2-E3B085C9AB24}">
+                <p16:designElem xmlns:p16="http://schemas.microsoft.com/office/powerpoint/2015/main" val="1"/>
+              </p:ext>
+            </p:extLst>
+          </p:nvPr>
+        </p:nvSpPr>
+        <p:spPr>
+          <a:xfrm>
+            <a:off x="8186411" y="644485"/>
+            <a:ext cx="3353835" cy="5129784"/>
+          </a:xfrm>
+          <a:prstGeom prst="rect">
+            <a:avLst/>
+          </a:prstGeom>
+          <a:solidFill>
+            <a:srgbClr val="FFFFFF"/>
+          </a:solidFill>
+          <a:ln>
+            <a:noFill/>
+          </a:ln>
+        </p:spPr>
+        <p:style>
+          <a:lnRef idx="2">
+            <a:schemeClr val="accent1">
+              <a:shade val="50000"/>
+            </a:schemeClr>
+          </a:lnRef>
+          <a:fillRef idx="1">
+            <a:schemeClr val="accent1"/>
+          </a:fillRef>
+          <a:effectRef idx="0">
+            <a:schemeClr val="accent1"/>
+          </a:effectRef>
+          <a:fontRef idx="minor">
+            <a:schemeClr val="lt1"/>
+          </a:fontRef>
+        </p:style>
+        <p:txBody>
+          <a:bodyPr rtlCol="0" anchor="ctr"/>
+          <a:lstStyle/>
+          <a:p>
+            <a:pPr algn="ctr"/>
+            <a:endParaRPr lang="en-US"/>
+          </a:p>
+        </p:txBody>
+      </p:sp>
+      <p:pic>
+        <p:nvPicPr>
+          <p:cNvPr id="5" name="Picture 4" descr="A close-up of a computer code&#10;&#10;Description automatically generated">
+            <a:extLst>
+              <a:ext uri="{FF2B5EF4-FFF2-40B4-BE49-F238E27FC236}">
+                <a16:creationId xmlns:a16="http://schemas.microsoft.com/office/drawing/2014/main" id="{E4D481BC-CAB9-2FB9-6805-798A7F5FD611}"/>
+              </a:ext>
+            </a:extLst>
+          </p:cNvPr>
+          <p:cNvPicPr>
+            <a:picLocks noChangeAspect="1"/>
+          </p:cNvPicPr>
+          <p:nvPr/>
+        </p:nvPicPr>
+        <p:blipFill rotWithShape="1">
+          <a:blip r:embed="rId3"/>
+          <a:srcRect l="647" t="-1" r="59869" b="-1"/>
+          <a:stretch/>
+        </p:blipFill>
+        <p:spPr>
+          <a:xfrm>
+            <a:off x="8297056" y="1140883"/>
+            <a:ext cx="3176659" cy="2252756"/>
+          </a:xfrm>
+          <a:prstGeom prst="rect">
+            <a:avLst/>
+          </a:prstGeom>
+        </p:spPr>
+      </p:pic>
+      <p:pic>
+        <p:nvPicPr>
+          <p:cNvPr id="7" name="Picture 6" descr="A white background with black text&#10;&#10;Description automatically generated">
+            <a:extLst>
+              <a:ext uri="{FF2B5EF4-FFF2-40B4-BE49-F238E27FC236}">
+                <a16:creationId xmlns:a16="http://schemas.microsoft.com/office/drawing/2014/main" id="{5056FE21-1B6C-6153-535A-841EC21AEE1C}"/>
+              </a:ext>
+            </a:extLst>
+          </p:cNvPr>
+          <p:cNvPicPr>
+            <a:picLocks noChangeAspect="1"/>
+          </p:cNvPicPr>
+          <p:nvPr/>
+        </p:nvPicPr>
+        <p:blipFill rotWithShape="1">
+          <a:blip r:embed="rId4"/>
+          <a:srcRect l="8688" t="1947" r="30865" b="22207"/>
+          <a:stretch/>
+        </p:blipFill>
+        <p:spPr>
+          <a:xfrm>
+            <a:off x="8178428" y="3878636"/>
+            <a:ext cx="3361817" cy="1539611"/>
+          </a:xfrm>
+          <a:prstGeom prst="rect">
+            <a:avLst/>
+          </a:prstGeom>
+        </p:spPr>
+      </p:pic>
+      <p:sp>
+        <p:nvSpPr>
+          <p:cNvPr id="8" name="TextBox 7">
+            <a:extLst>
+              <a:ext uri="{FF2B5EF4-FFF2-40B4-BE49-F238E27FC236}">
+                <a16:creationId xmlns:a16="http://schemas.microsoft.com/office/drawing/2014/main" id="{7FE2FE05-6978-F45E-45F9-DBDF44406B05}"/>
+              </a:ext>
+            </a:extLst>
+          </p:cNvPr>
+          <p:cNvSpPr txBox="1"/>
+          <p:nvPr/>
+        </p:nvSpPr>
+        <p:spPr>
+          <a:xfrm>
+            <a:off x="8186411" y="3343959"/>
+            <a:ext cx="926857" cy="369332"/>
+          </a:xfrm>
+          <a:prstGeom prst="rect">
+            <a:avLst/>
+          </a:prstGeom>
+          <a:noFill/>
+        </p:spPr>
+        <p:txBody>
+          <a:bodyPr wrap="none" rtlCol="0">
+            <a:spAutoFit/>
+          </a:bodyPr>
+          <a:lstStyle/>
+          <a:p>
+            <a:r>
+              <a:rPr lang="en-US" u="sng" dirty="0"/>
+              <a:t>Output:</a:t>
+            </a:r>
+          </a:p>
+        </p:txBody>
+      </p:sp>
+      <p:sp>
+        <p:nvSpPr>
+          <p:cNvPr id="9" name="TextBox 8">
+            <a:extLst>
+              <a:ext uri="{FF2B5EF4-FFF2-40B4-BE49-F238E27FC236}">
+                <a16:creationId xmlns:a16="http://schemas.microsoft.com/office/drawing/2014/main" id="{36CBE49B-E512-FFF3-0164-B4DC838C4768}"/>
+              </a:ext>
+            </a:extLst>
+          </p:cNvPr>
+          <p:cNvSpPr txBox="1"/>
+          <p:nvPr/>
+        </p:nvSpPr>
+        <p:spPr>
+          <a:xfrm>
+            <a:off x="8186411" y="679442"/>
+            <a:ext cx="716863" cy="369332"/>
+          </a:xfrm>
+          <a:prstGeom prst="rect">
+            <a:avLst/>
+          </a:prstGeom>
+          <a:noFill/>
+        </p:spPr>
+        <p:txBody>
+          <a:bodyPr wrap="none" rtlCol="0">
+            <a:spAutoFit/>
+          </a:bodyPr>
+          <a:lstStyle/>
+          <a:p>
+            <a:r>
+              <a:rPr lang="en-US" u="sng" dirty="0"/>
+              <a:t>Input:</a:t>
+            </a:r>
+          </a:p>
+        </p:txBody>
+      </p:sp>
+    </p:spTree>
+    <p:extLst>
+      <p:ext uri="{BB962C8B-B14F-4D97-AF65-F5344CB8AC3E}">
+        <p14:creationId xmlns:p14="http://schemas.microsoft.com/office/powerpoint/2010/main" val="334704159"/>
+      </p:ext>
+    </p:extLst>
+  </p:cSld>
+  <p:clrMapOvr>
+    <a:masterClrMapping/>
+  </p:clrMapOvr>
+</p:sld>
+</file>
+
+<file path=ppt/slides/slide16.xml><?xml version="1.0" encoding="utf-8"?>
 <p:sld xmlns:a="http://schemas.openxmlformats.org/drawingml/2006/main" xmlns:r="http://schemas.openxmlformats.org/officeDocument/2006/relationships" xmlns:p="http://schemas.openxmlformats.org/presentationml/2006/main">
   <p:cSld>
     <p:spTree>
@@ -20094,43 +21658,241 @@
           <a:p>
             <a:r>
               <a:rPr lang="en-US" dirty="0"/>
-              <a:t>Activity 1: Power Analysis</a:t>
+              <a:t>Activity 1: Power Analysis in R</a:t>
             </a:r>
           </a:p>
         </p:txBody>
       </p:sp>
-      <p:sp>
-        <p:nvSpPr>
-          <p:cNvPr id="3" name="Content Placeholder 2">
-            <a:extLst>
-              <a:ext uri="{FF2B5EF4-FFF2-40B4-BE49-F238E27FC236}">
-                <a16:creationId xmlns:a16="http://schemas.microsoft.com/office/drawing/2014/main" id="{89384D73-49C2-5AE1-C3E9-5099BF61D483}"/>
-              </a:ext>
-            </a:extLst>
-          </p:cNvPr>
-          <p:cNvSpPr>
-            <a:spLocks noGrp="1"/>
-          </p:cNvSpPr>
-          <p:nvPr>
-            <p:ph idx="1"/>
-          </p:nvPr>
-        </p:nvSpPr>
-        <p:spPr/>
-        <p:txBody>
-          <a:bodyPr/>
-          <a:lstStyle/>
-          <a:p>
-            <a:r>
-              <a:rPr lang="en-US" dirty="0"/>
-              <a:t>Hands-on calculations</a:t>
-            </a:r>
-          </a:p>
-        </p:txBody>
-      </p:sp>
+      <mc:AlternateContent xmlns:mc="http://schemas.openxmlformats.org/markup-compatibility/2006">
+        <mc:Choice xmlns:a14="http://schemas.microsoft.com/office/drawing/2010/main" Requires="a14">
+          <p:sp>
+            <p:nvSpPr>
+              <p:cNvPr id="3" name="Content Placeholder 2">
+                <a:extLst>
+                  <a:ext uri="{FF2B5EF4-FFF2-40B4-BE49-F238E27FC236}">
+                    <a16:creationId xmlns:a16="http://schemas.microsoft.com/office/drawing/2014/main" id="{89384D73-49C2-5AE1-C3E9-5099BF61D483}"/>
+                  </a:ext>
+                </a:extLst>
+              </p:cNvPr>
+              <p:cNvSpPr>
+                <a:spLocks noGrp="1"/>
+              </p:cNvSpPr>
+              <p:nvPr>
+                <p:ph idx="1"/>
+              </p:nvPr>
+            </p:nvSpPr>
+            <p:spPr>
+              <a:xfrm>
+                <a:off x="2231136" y="2638044"/>
+                <a:ext cx="7729728" cy="4005644"/>
+              </a:xfrm>
+            </p:spPr>
+            <p:txBody>
+              <a:bodyPr>
+                <a:normAutofit lnSpcReduction="10000"/>
+              </a:bodyPr>
+              <a:lstStyle/>
+              <a:p>
+                <a:r>
+                  <a:rPr lang="en-US" dirty="0"/>
+                  <a:t>The ‘</a:t>
+                </a:r>
+                <a:r>
+                  <a:rPr lang="en-US" dirty="0" err="1"/>
+                  <a:t>pwr</a:t>
+                </a:r>
+                <a:r>
+                  <a:rPr lang="en-US" dirty="0"/>
+                  <a:t>’ package (</a:t>
+                </a:r>
+                <a:r>
+                  <a:rPr lang="en-US" dirty="0" err="1"/>
+                  <a:t>Champley</a:t>
+                </a:r>
+                <a:r>
+                  <a:rPr lang="en-US" dirty="0"/>
+                  <a:t> 2020) can perform power analyses for a variety of common statistical test.</a:t>
+                </a:r>
+              </a:p>
+              <a:p>
+                <a:r>
+                  <a:rPr lang="en-US" dirty="0">
+                    <a:solidFill>
+                      <a:srgbClr val="2B2B2B"/>
+                    </a:solidFill>
+                  </a:rPr>
+                  <a:t>E</a:t>
+                </a:r>
+                <a:r>
+                  <a:rPr lang="en-US" b="0" i="0" dirty="0">
+                    <a:solidFill>
+                      <a:srgbClr val="2B2B2B"/>
+                    </a:solidFill>
+                    <a:effectLst/>
+                  </a:rPr>
+                  <a:t>nter three of the four parameters (effect size, sample size, significance level, power) and the fourth is calculated.</a:t>
+                </a:r>
+              </a:p>
+              <a:p>
+                <a:r>
+                  <a:rPr lang="en-US" b="1" dirty="0">
+                    <a:solidFill>
+                      <a:srgbClr val="2B2B2B"/>
+                    </a:solidFill>
+                  </a:rPr>
+                  <a:t>Exercise: </a:t>
+                </a:r>
+                <a:r>
+                  <a:rPr lang="en-US" dirty="0">
+                    <a:solidFill>
+                      <a:srgbClr val="2B2B2B"/>
+                    </a:solidFill>
+                  </a:rPr>
+                  <a:t>Using the code provided in ‘</a:t>
+                </a:r>
+                <a:r>
+                  <a:rPr lang="en-US" dirty="0" err="1">
+                    <a:solidFill>
+                      <a:srgbClr val="2B2B2B"/>
+                    </a:solidFill>
+                  </a:rPr>
+                  <a:t>activities.R</a:t>
+                </a:r>
+                <a:r>
+                  <a:rPr lang="en-US" dirty="0">
+                    <a:solidFill>
+                      <a:srgbClr val="2B2B2B"/>
+                    </a:solidFill>
+                  </a:rPr>
+                  <a:t>’, determine how many participants you would need in each group (sample size) to have a power of 80% and a moderate effect size of 25% for each of the following tests.</a:t>
+                </a:r>
+              </a:p>
+              <a:p>
+                <a:pPr lvl="1"/>
+                <a:r>
+                  <a:rPr lang="en-US" b="1" dirty="0">
+                    <a:solidFill>
+                      <a:srgbClr val="2B2B2B"/>
+                    </a:solidFill>
+                  </a:rPr>
+                  <a:t>One-way ANOVA</a:t>
+                </a:r>
+              </a:p>
+              <a:p>
+                <a:pPr lvl="1"/>
+                <a:r>
+                  <a:rPr lang="en-US" b="1" dirty="0">
+                    <a:solidFill>
+                      <a:srgbClr val="2B2B2B"/>
+                    </a:solidFill>
+                  </a:rPr>
+                  <a:t>GML</a:t>
+                </a:r>
+              </a:p>
+              <a:p>
+                <a:pPr lvl="1"/>
+                <a:r>
+                  <a:rPr lang="en-US" b="1" dirty="0"/>
+                  <a:t>Paired t-test (two tailed)</a:t>
+                </a:r>
+              </a:p>
+              <a:p>
+                <a:pPr lvl="1"/>
+                <a:r>
+                  <a:rPr lang="en-US" b="1" dirty="0"/>
+                  <a:t>Independent t-test (one tailed – “greater”)</a:t>
+                </a:r>
+              </a:p>
+              <a:p>
+                <a:pPr lvl="1"/>
+                <a14:m>
+                  <m:oMath xmlns:m="http://schemas.openxmlformats.org/officeDocument/2006/math">
+                    <m:sSup>
+                      <m:sSupPr>
+                        <m:ctrlPr>
+                          <a:rPr lang="en-US" b="1" i="1" smtClean="0">
+                            <a:latin typeface="Cambria Math" panose="02040503050406030204" pitchFamily="18" charset="0"/>
+                            <a:ea typeface="Cambria Math" panose="02040503050406030204" pitchFamily="18" charset="0"/>
+                          </a:rPr>
+                        </m:ctrlPr>
+                      </m:sSupPr>
+                      <m:e>
+                        <m:r>
+                          <a:rPr lang="en-US" b="1" i="1" smtClean="0">
+                            <a:latin typeface="Cambria Math" panose="02040503050406030204" pitchFamily="18" charset="0"/>
+                            <a:ea typeface="Cambria Math" panose="02040503050406030204" pitchFamily="18" charset="0"/>
+                          </a:rPr>
+                          <m:t>𝚾</m:t>
+                        </m:r>
+                      </m:e>
+                      <m:sup>
+                        <m:r>
+                          <a:rPr lang="en-US" b="1" i="1" smtClean="0">
+                            <a:latin typeface="Cambria Math" panose="02040503050406030204" pitchFamily="18" charset="0"/>
+                            <a:ea typeface="Cambria Math" panose="02040503050406030204" pitchFamily="18" charset="0"/>
+                          </a:rPr>
+                          <m:t>𝟐</m:t>
+                        </m:r>
+                      </m:sup>
+                    </m:sSup>
+                  </m:oMath>
+                </a14:m>
+                <a:r>
+                  <a:rPr lang="en-US" b="1" dirty="0"/>
+                  <a:t> test </a:t>
+                </a:r>
+              </a:p>
+            </p:txBody>
+          </p:sp>
+        </mc:Choice>
+        <mc:Fallback>
+          <p:sp>
+            <p:nvSpPr>
+              <p:cNvPr id="3" name="Content Placeholder 2">
+                <a:extLst>
+                  <a:ext uri="{FF2B5EF4-FFF2-40B4-BE49-F238E27FC236}">
+                    <a16:creationId xmlns:a16="http://schemas.microsoft.com/office/drawing/2014/main" id="{89384D73-49C2-5AE1-C3E9-5099BF61D483}"/>
+                  </a:ext>
+                </a:extLst>
+              </p:cNvPr>
+              <p:cNvSpPr>
+                <a:spLocks noGrp="1" noRot="1" noChangeAspect="1" noMove="1" noResize="1" noEditPoints="1" noAdjustHandles="1" noChangeArrowheads="1" noChangeShapeType="1" noTextEdit="1"/>
+              </p:cNvSpPr>
+              <p:nvPr>
+                <p:ph idx="1"/>
+              </p:nvPr>
+            </p:nvSpPr>
+            <p:spPr>
+              <a:xfrm>
+                <a:off x="2231136" y="2638044"/>
+                <a:ext cx="7729728" cy="4005644"/>
+              </a:xfrm>
+              <a:blipFill>
+                <a:blip r:embed="rId3"/>
+                <a:stretch>
+                  <a:fillRect l="-492" t="-1262"/>
+                </a:stretch>
+              </a:blipFill>
+            </p:spPr>
+            <p:txBody>
+              <a:bodyPr/>
+              <a:lstStyle/>
+              <a:p>
+                <a:r>
+                  <a:rPr lang="en-US">
+                    <a:noFill/>
+                  </a:rPr>
+                  <a:t> </a:t>
+                </a:r>
+              </a:p>
+            </p:txBody>
+          </p:sp>
+        </mc:Fallback>
+      </mc:AlternateContent>
     </p:spTree>
     <p:extLst>
       <p:ext uri="{BB962C8B-B14F-4D97-AF65-F5344CB8AC3E}">
-        <p14:creationId xmlns:p14="http://schemas.microsoft.com/office/powerpoint/2010/main" val="334704159"/>
+        <p14:creationId xmlns:p14="http://schemas.microsoft.com/office/powerpoint/2010/main" val="14605938"/>
       </p:ext>
     </p:extLst>
   </p:cSld>
@@ -20140,7 +21902,7 @@
 </p:sld>
 </file>
 
-<file path=ppt/slides/slide15.xml><?xml version="1.0" encoding="utf-8"?>
+<file path=ppt/slides/slide17.xml><?xml version="1.0" encoding="utf-8"?>
 <p:sld xmlns:a="http://schemas.openxmlformats.org/drawingml/2006/main" xmlns:r="http://schemas.openxmlformats.org/officeDocument/2006/relationships" xmlns:p="http://schemas.openxmlformats.org/presentationml/2006/main">
   <p:cSld>
     <p:bg>
@@ -20233,7 +21995,7 @@
 </p:sld>
 </file>
 
-<file path=ppt/slides/slide16.xml><?xml version="1.0" encoding="utf-8"?>
+<file path=ppt/slides/slide18.xml><?xml version="1.0" encoding="utf-8"?>
 <p:sld xmlns:a="http://schemas.openxmlformats.org/drawingml/2006/main" xmlns:r="http://schemas.openxmlformats.org/officeDocument/2006/relationships" xmlns:p="http://schemas.openxmlformats.org/presentationml/2006/main">
   <p:cSld>
     <p:spTree>
@@ -20316,7 +22078,7 @@
 </p:sld>
 </file>
 
-<file path=ppt/slides/slide17.xml><?xml version="1.0" encoding="utf-8"?>
+<file path=ppt/slides/slide19.xml><?xml version="1.0" encoding="utf-8"?>
 <p:sld xmlns:a="http://schemas.openxmlformats.org/drawingml/2006/main" xmlns:r="http://schemas.openxmlformats.org/officeDocument/2006/relationships" xmlns:p="http://schemas.openxmlformats.org/presentationml/2006/main">
   <p:cSld>
     <p:spTree>
@@ -20390,175 +22152,6 @@
     <p:extLst>
       <p:ext uri="{BB962C8B-B14F-4D97-AF65-F5344CB8AC3E}">
         <p14:creationId xmlns:p14="http://schemas.microsoft.com/office/powerpoint/2010/main" val="2148027793"/>
-      </p:ext>
-    </p:extLst>
-  </p:cSld>
-  <p:clrMapOvr>
-    <a:masterClrMapping/>
-  </p:clrMapOvr>
-</p:sld>
-</file>
-
-<file path=ppt/slides/slide18.xml><?xml version="1.0" encoding="utf-8"?>
-<p:sld xmlns:a="http://schemas.openxmlformats.org/drawingml/2006/main" xmlns:r="http://schemas.openxmlformats.org/officeDocument/2006/relationships" xmlns:p="http://schemas.openxmlformats.org/presentationml/2006/main">
-  <p:cSld>
-    <p:spTree>
-      <p:nvGrpSpPr>
-        <p:cNvPr id="1" name=""/>
-        <p:cNvGrpSpPr/>
-        <p:nvPr/>
-      </p:nvGrpSpPr>
-      <p:grpSpPr>
-        <a:xfrm>
-          <a:off x="0" y="0"/>
-          <a:ext cx="0" cy="0"/>
-          <a:chOff x="0" y="0"/>
-          <a:chExt cx="0" cy="0"/>
-        </a:xfrm>
-      </p:grpSpPr>
-      <p:sp>
-        <p:nvSpPr>
-          <p:cNvPr id="2" name="Title 1">
-            <a:extLst>
-              <a:ext uri="{FF2B5EF4-FFF2-40B4-BE49-F238E27FC236}">
-                <a16:creationId xmlns:a16="http://schemas.microsoft.com/office/drawing/2014/main" id="{FEB5A3D2-72C5-7C93-7AD6-A02CBF7AE2D4}"/>
-              </a:ext>
-            </a:extLst>
-          </p:cNvPr>
-          <p:cNvSpPr>
-            <a:spLocks noGrp="1"/>
-          </p:cNvSpPr>
-          <p:nvPr>
-            <p:ph type="title"/>
-          </p:nvPr>
-        </p:nvSpPr>
-        <p:spPr/>
-        <p:txBody>
-          <a:bodyPr/>
-          <a:lstStyle/>
-          <a:p>
-            <a:r>
-              <a:rPr lang="en-US" dirty="0"/>
-              <a:t>Activity 2: Probability in Computational Biology</a:t>
-            </a:r>
-          </a:p>
-        </p:txBody>
-      </p:sp>
-      <p:sp>
-        <p:nvSpPr>
-          <p:cNvPr id="3" name="Content Placeholder 2">
-            <a:extLst>
-              <a:ext uri="{FF2B5EF4-FFF2-40B4-BE49-F238E27FC236}">
-                <a16:creationId xmlns:a16="http://schemas.microsoft.com/office/drawing/2014/main" id="{DA5712A5-5C06-6BE9-99BB-928B9F8CB8E4}"/>
-              </a:ext>
-            </a:extLst>
-          </p:cNvPr>
-          <p:cNvSpPr>
-            <a:spLocks noGrp="1"/>
-          </p:cNvSpPr>
-          <p:nvPr>
-            <p:ph idx="1"/>
-          </p:nvPr>
-        </p:nvSpPr>
-        <p:spPr/>
-        <p:txBody>
-          <a:bodyPr/>
-          <a:lstStyle/>
-          <a:p>
-            <a:r>
-              <a:rPr lang="en-US" dirty="0"/>
-              <a:t>Interactive simulation</a:t>
-            </a:r>
-          </a:p>
-        </p:txBody>
-      </p:sp>
-    </p:spTree>
-    <p:extLst>
-      <p:ext uri="{BB962C8B-B14F-4D97-AF65-F5344CB8AC3E}">
-        <p14:creationId xmlns:p14="http://schemas.microsoft.com/office/powerpoint/2010/main" val="1890256688"/>
-      </p:ext>
-    </p:extLst>
-  </p:cSld>
-  <p:clrMapOvr>
-    <a:masterClrMapping/>
-  </p:clrMapOvr>
-</p:sld>
-</file>
-
-<file path=ppt/slides/slide19.xml><?xml version="1.0" encoding="utf-8"?>
-<p:sld xmlns:a="http://schemas.openxmlformats.org/drawingml/2006/main" xmlns:r="http://schemas.openxmlformats.org/officeDocument/2006/relationships" xmlns:p="http://schemas.openxmlformats.org/presentationml/2006/main">
-  <p:cSld>
-    <p:spTree>
-      <p:nvGrpSpPr>
-        <p:cNvPr id="1" name=""/>
-        <p:cNvGrpSpPr/>
-        <p:nvPr/>
-      </p:nvGrpSpPr>
-      <p:grpSpPr>
-        <a:xfrm>
-          <a:off x="0" y="0"/>
-          <a:ext cx="0" cy="0"/>
-          <a:chOff x="0" y="0"/>
-          <a:chExt cx="0" cy="0"/>
-        </a:xfrm>
-      </p:grpSpPr>
-      <p:sp>
-        <p:nvSpPr>
-          <p:cNvPr id="2" name="Title 1">
-            <a:extLst>
-              <a:ext uri="{FF2B5EF4-FFF2-40B4-BE49-F238E27FC236}">
-                <a16:creationId xmlns:a16="http://schemas.microsoft.com/office/drawing/2014/main" id="{BF54418F-C30C-10C4-096E-1D69A533452C}"/>
-              </a:ext>
-            </a:extLst>
-          </p:cNvPr>
-          <p:cNvSpPr>
-            <a:spLocks noGrp="1"/>
-          </p:cNvSpPr>
-          <p:nvPr>
-            <p:ph type="title"/>
-          </p:nvPr>
-        </p:nvSpPr>
-        <p:spPr/>
-        <p:txBody>
-          <a:bodyPr/>
-          <a:lstStyle/>
-          <a:p>
-            <a:r>
-              <a:rPr lang="en-US" dirty="0"/>
-              <a:t>Transformations</a:t>
-            </a:r>
-          </a:p>
-        </p:txBody>
-      </p:sp>
-      <p:sp>
-        <p:nvSpPr>
-          <p:cNvPr id="3" name="Content Placeholder 2">
-            <a:extLst>
-              <a:ext uri="{FF2B5EF4-FFF2-40B4-BE49-F238E27FC236}">
-                <a16:creationId xmlns:a16="http://schemas.microsoft.com/office/drawing/2014/main" id="{1CAA0C9C-784E-F7F6-1B24-99FB26E299B7}"/>
-              </a:ext>
-            </a:extLst>
-          </p:cNvPr>
-          <p:cNvSpPr>
-            <a:spLocks noGrp="1"/>
-          </p:cNvSpPr>
-          <p:nvPr>
-            <p:ph idx="1"/>
-          </p:nvPr>
-        </p:nvSpPr>
-        <p:spPr/>
-        <p:txBody>
-          <a:bodyPr/>
-          <a:lstStyle/>
-          <a:p>
-            <a:endParaRPr lang="en-US"/>
-          </a:p>
-        </p:txBody>
-      </p:sp>
-    </p:spTree>
-    <p:extLst>
-      <p:ext uri="{BB962C8B-B14F-4D97-AF65-F5344CB8AC3E}">
-        <p14:creationId xmlns:p14="http://schemas.microsoft.com/office/powerpoint/2010/main" val="1995714324"/>
       </p:ext>
     </p:extLst>
   </p:cSld>
@@ -20681,6 +22274,175 @@
           <p:cNvPr id="2" name="Title 1">
             <a:extLst>
               <a:ext uri="{FF2B5EF4-FFF2-40B4-BE49-F238E27FC236}">
+                <a16:creationId xmlns:a16="http://schemas.microsoft.com/office/drawing/2014/main" id="{FEB5A3D2-72C5-7C93-7AD6-A02CBF7AE2D4}"/>
+              </a:ext>
+            </a:extLst>
+          </p:cNvPr>
+          <p:cNvSpPr>
+            <a:spLocks noGrp="1"/>
+          </p:cNvSpPr>
+          <p:nvPr>
+            <p:ph type="title"/>
+          </p:nvPr>
+        </p:nvSpPr>
+        <p:spPr/>
+        <p:txBody>
+          <a:bodyPr/>
+          <a:lstStyle/>
+          <a:p>
+            <a:r>
+              <a:rPr lang="en-US" dirty="0"/>
+              <a:t>Activity 2: Probability in Computational Biology</a:t>
+            </a:r>
+          </a:p>
+        </p:txBody>
+      </p:sp>
+      <p:sp>
+        <p:nvSpPr>
+          <p:cNvPr id="3" name="Content Placeholder 2">
+            <a:extLst>
+              <a:ext uri="{FF2B5EF4-FFF2-40B4-BE49-F238E27FC236}">
+                <a16:creationId xmlns:a16="http://schemas.microsoft.com/office/drawing/2014/main" id="{DA5712A5-5C06-6BE9-99BB-928B9F8CB8E4}"/>
+              </a:ext>
+            </a:extLst>
+          </p:cNvPr>
+          <p:cNvSpPr>
+            <a:spLocks noGrp="1"/>
+          </p:cNvSpPr>
+          <p:nvPr>
+            <p:ph idx="1"/>
+          </p:nvPr>
+        </p:nvSpPr>
+        <p:spPr/>
+        <p:txBody>
+          <a:bodyPr/>
+          <a:lstStyle/>
+          <a:p>
+            <a:r>
+              <a:rPr lang="en-US" dirty="0"/>
+              <a:t>Interactive simulation</a:t>
+            </a:r>
+          </a:p>
+        </p:txBody>
+      </p:sp>
+    </p:spTree>
+    <p:extLst>
+      <p:ext uri="{BB962C8B-B14F-4D97-AF65-F5344CB8AC3E}">
+        <p14:creationId xmlns:p14="http://schemas.microsoft.com/office/powerpoint/2010/main" val="1890256688"/>
+      </p:ext>
+    </p:extLst>
+  </p:cSld>
+  <p:clrMapOvr>
+    <a:masterClrMapping/>
+  </p:clrMapOvr>
+</p:sld>
+</file>
+
+<file path=ppt/slides/slide21.xml><?xml version="1.0" encoding="utf-8"?>
+<p:sld xmlns:a="http://schemas.openxmlformats.org/drawingml/2006/main" xmlns:r="http://schemas.openxmlformats.org/officeDocument/2006/relationships" xmlns:p="http://schemas.openxmlformats.org/presentationml/2006/main">
+  <p:cSld>
+    <p:spTree>
+      <p:nvGrpSpPr>
+        <p:cNvPr id="1" name=""/>
+        <p:cNvGrpSpPr/>
+        <p:nvPr/>
+      </p:nvGrpSpPr>
+      <p:grpSpPr>
+        <a:xfrm>
+          <a:off x="0" y="0"/>
+          <a:ext cx="0" cy="0"/>
+          <a:chOff x="0" y="0"/>
+          <a:chExt cx="0" cy="0"/>
+        </a:xfrm>
+      </p:grpSpPr>
+      <p:sp>
+        <p:nvSpPr>
+          <p:cNvPr id="2" name="Title 1">
+            <a:extLst>
+              <a:ext uri="{FF2B5EF4-FFF2-40B4-BE49-F238E27FC236}">
+                <a16:creationId xmlns:a16="http://schemas.microsoft.com/office/drawing/2014/main" id="{BF54418F-C30C-10C4-096E-1D69A533452C}"/>
+              </a:ext>
+            </a:extLst>
+          </p:cNvPr>
+          <p:cNvSpPr>
+            <a:spLocks noGrp="1"/>
+          </p:cNvSpPr>
+          <p:nvPr>
+            <p:ph type="title"/>
+          </p:nvPr>
+        </p:nvSpPr>
+        <p:spPr/>
+        <p:txBody>
+          <a:bodyPr/>
+          <a:lstStyle/>
+          <a:p>
+            <a:r>
+              <a:rPr lang="en-US" dirty="0"/>
+              <a:t>Transformations</a:t>
+            </a:r>
+          </a:p>
+        </p:txBody>
+      </p:sp>
+      <p:sp>
+        <p:nvSpPr>
+          <p:cNvPr id="3" name="Content Placeholder 2">
+            <a:extLst>
+              <a:ext uri="{FF2B5EF4-FFF2-40B4-BE49-F238E27FC236}">
+                <a16:creationId xmlns:a16="http://schemas.microsoft.com/office/drawing/2014/main" id="{1CAA0C9C-784E-F7F6-1B24-99FB26E299B7}"/>
+              </a:ext>
+            </a:extLst>
+          </p:cNvPr>
+          <p:cNvSpPr>
+            <a:spLocks noGrp="1"/>
+          </p:cNvSpPr>
+          <p:nvPr>
+            <p:ph idx="1"/>
+          </p:nvPr>
+        </p:nvSpPr>
+        <p:spPr/>
+        <p:txBody>
+          <a:bodyPr/>
+          <a:lstStyle/>
+          <a:p>
+            <a:endParaRPr lang="en-US"/>
+          </a:p>
+        </p:txBody>
+      </p:sp>
+    </p:spTree>
+    <p:extLst>
+      <p:ext uri="{BB962C8B-B14F-4D97-AF65-F5344CB8AC3E}">
+        <p14:creationId xmlns:p14="http://schemas.microsoft.com/office/powerpoint/2010/main" val="1995714324"/>
+      </p:ext>
+    </p:extLst>
+  </p:cSld>
+  <p:clrMapOvr>
+    <a:masterClrMapping/>
+  </p:clrMapOvr>
+</p:sld>
+</file>
+
+<file path=ppt/slides/slide22.xml><?xml version="1.0" encoding="utf-8"?>
+<p:sld xmlns:a="http://schemas.openxmlformats.org/drawingml/2006/main" xmlns:r="http://schemas.openxmlformats.org/officeDocument/2006/relationships" xmlns:p="http://schemas.openxmlformats.org/presentationml/2006/main">
+  <p:cSld>
+    <p:spTree>
+      <p:nvGrpSpPr>
+        <p:cNvPr id="1" name=""/>
+        <p:cNvGrpSpPr/>
+        <p:nvPr/>
+      </p:nvGrpSpPr>
+      <p:grpSpPr>
+        <a:xfrm>
+          <a:off x="0" y="0"/>
+          <a:ext cx="0" cy="0"/>
+          <a:chOff x="0" y="0"/>
+          <a:chExt cx="0" cy="0"/>
+        </a:xfrm>
+      </p:grpSpPr>
+      <p:sp>
+        <p:nvSpPr>
+          <p:cNvPr id="2" name="Title 1">
+            <a:extLst>
+              <a:ext uri="{FF2B5EF4-FFF2-40B4-BE49-F238E27FC236}">
                 <a16:creationId xmlns:a16="http://schemas.microsoft.com/office/drawing/2014/main" id="{28B1204B-2D43-91AE-A3B7-76CF9C7339D3}"/>
               </a:ext>
             </a:extLst>
@@ -20742,7 +22504,7 @@
 </p:sld>
 </file>
 
-<file path=ppt/slides/slide21.xml><?xml version="1.0" encoding="utf-8"?>
+<file path=ppt/slides/slide23.xml><?xml version="1.0" encoding="utf-8"?>
 <p:sld xmlns:a="http://schemas.openxmlformats.org/drawingml/2006/main" xmlns:r="http://schemas.openxmlformats.org/officeDocument/2006/relationships" xmlns:p="http://schemas.openxmlformats.org/presentationml/2006/main">
   <p:cSld>
     <p:spTree>
@@ -20825,7 +22587,7 @@
 </p:sld>
 </file>
 
-<file path=ppt/slides/slide22.xml><?xml version="1.0" encoding="utf-8"?>
+<file path=ppt/slides/slide24.xml><?xml version="1.0" encoding="utf-8"?>
 <p:sld xmlns:a="http://schemas.openxmlformats.org/drawingml/2006/main" xmlns:r="http://schemas.openxmlformats.org/officeDocument/2006/relationships" xmlns:p="http://schemas.openxmlformats.org/presentationml/2006/main">
   <p:cSld>
     <p:bg>
@@ -20916,7 +22678,7 @@
 </p:sld>
 </file>
 
-<file path=ppt/slides/slide23.xml><?xml version="1.0" encoding="utf-8"?>
+<file path=ppt/slides/slide25.xml><?xml version="1.0" encoding="utf-8"?>
 <p:sld xmlns:a="http://schemas.openxmlformats.org/drawingml/2006/main" xmlns:r="http://schemas.openxmlformats.org/officeDocument/2006/relationships" xmlns:p="http://schemas.openxmlformats.org/presentationml/2006/main">
   <p:cSld>
     <p:spTree>
@@ -20999,7 +22761,7 @@
 </p:sld>
 </file>
 
-<file path=ppt/slides/slide24.xml><?xml version="1.0" encoding="utf-8"?>
+<file path=ppt/slides/slide26.xml><?xml version="1.0" encoding="utf-8"?>
 <p:sld xmlns:a="http://schemas.openxmlformats.org/drawingml/2006/main" xmlns:r="http://schemas.openxmlformats.org/officeDocument/2006/relationships" xmlns:p="http://schemas.openxmlformats.org/presentationml/2006/main">
   <p:cSld>
     <p:spTree>
@@ -21082,7 +22844,99 @@
 </p:sld>
 </file>
 
-<file path=ppt/slides/slide25.xml><?xml version="1.0" encoding="utf-8"?>
+<file path=ppt/slides/slide27.xml><?xml version="1.0" encoding="utf-8"?>
+<p:sld xmlns:a="http://schemas.openxmlformats.org/drawingml/2006/main" xmlns:r="http://schemas.openxmlformats.org/officeDocument/2006/relationships" xmlns:p="http://schemas.openxmlformats.org/presentationml/2006/main">
+  <p:cSld>
+    <p:spTree>
+      <p:nvGrpSpPr>
+        <p:cNvPr id="1" name=""/>
+        <p:cNvGrpSpPr/>
+        <p:nvPr/>
+      </p:nvGrpSpPr>
+      <p:grpSpPr>
+        <a:xfrm>
+          <a:off x="0" y="0"/>
+          <a:ext cx="0" cy="0"/>
+          <a:chOff x="0" y="0"/>
+          <a:chExt cx="0" cy="0"/>
+        </a:xfrm>
+      </p:grpSpPr>
+      <p:sp>
+        <p:nvSpPr>
+          <p:cNvPr id="2" name="Title 1">
+            <a:extLst>
+              <a:ext uri="{FF2B5EF4-FFF2-40B4-BE49-F238E27FC236}">
+                <a16:creationId xmlns:a16="http://schemas.microsoft.com/office/drawing/2014/main" id="{B79D1216-625F-0794-6558-C906699C5C81}"/>
+              </a:ext>
+            </a:extLst>
+          </p:cNvPr>
+          <p:cNvSpPr>
+            <a:spLocks noGrp="1"/>
+          </p:cNvSpPr>
+          <p:nvPr>
+            <p:ph type="ctrTitle"/>
+          </p:nvPr>
+        </p:nvSpPr>
+        <p:spPr/>
+        <p:txBody>
+          <a:bodyPr/>
+          <a:lstStyle/>
+          <a:p>
+            <a:r>
+              <a:rPr lang="en-US" dirty="0"/>
+              <a:t>5-Minute Break</a:t>
+            </a:r>
+          </a:p>
+        </p:txBody>
+      </p:sp>
+      <p:sp>
+        <p:nvSpPr>
+          <p:cNvPr id="3" name="Subtitle 2">
+            <a:extLst>
+              <a:ext uri="{FF2B5EF4-FFF2-40B4-BE49-F238E27FC236}">
+                <a16:creationId xmlns:a16="http://schemas.microsoft.com/office/drawing/2014/main" id="{4E1EC379-F4AF-011E-50AC-F857D607CE5F}"/>
+              </a:ext>
+            </a:extLst>
+          </p:cNvPr>
+          <p:cNvSpPr>
+            <a:spLocks noGrp="1"/>
+          </p:cNvSpPr>
+          <p:nvPr>
+            <p:ph type="subTitle" idx="1"/>
+          </p:nvPr>
+        </p:nvSpPr>
+        <p:spPr/>
+        <p:txBody>
+          <a:bodyPr/>
+          <a:lstStyle/>
+          <a:p>
+            <a:r>
+              <a:rPr lang="en-US" dirty="0"/>
+              <a:t>Stretch, use the restroom, grab a snack!</a:t>
+            </a:r>
+          </a:p>
+          <a:p>
+            <a:r>
+              <a:rPr lang="en-US" dirty="0"/>
+              <a:t>Meeting back here shortly.</a:t>
+            </a:r>
+          </a:p>
+        </p:txBody>
+      </p:sp>
+    </p:spTree>
+    <p:extLst>
+      <p:ext uri="{BB962C8B-B14F-4D97-AF65-F5344CB8AC3E}">
+        <p14:creationId xmlns:p14="http://schemas.microsoft.com/office/powerpoint/2010/main" val="1387418715"/>
+      </p:ext>
+    </p:extLst>
+  </p:cSld>
+  <p:clrMapOvr>
+    <a:masterClrMapping/>
+  </p:clrMapOvr>
+</p:sld>
+</file>
+
+<file path=ppt/slides/slide28.xml><?xml version="1.0" encoding="utf-8"?>
 <p:sld xmlns:a="http://schemas.openxmlformats.org/drawingml/2006/main" xmlns:r="http://schemas.openxmlformats.org/officeDocument/2006/relationships" xmlns:p="http://schemas.openxmlformats.org/presentationml/2006/main">
   <p:cSld>
     <p:bg>
@@ -21173,7 +23027,7 @@
 </p:sld>
 </file>
 
-<file path=ppt/slides/slide26.xml><?xml version="1.0" encoding="utf-8"?>
+<file path=ppt/slides/slide29.xml><?xml version="1.0" encoding="utf-8"?>
 <p:sld xmlns:a="http://schemas.openxmlformats.org/drawingml/2006/main" xmlns:r="http://schemas.openxmlformats.org/officeDocument/2006/relationships" xmlns:p="http://schemas.openxmlformats.org/presentationml/2006/main">
   <p:cSld>
     <p:spTree>
@@ -21247,276 +23101,6 @@
     <p:extLst>
       <p:ext uri="{BB962C8B-B14F-4D97-AF65-F5344CB8AC3E}">
         <p14:creationId xmlns:p14="http://schemas.microsoft.com/office/powerpoint/2010/main" val="246850864"/>
-      </p:ext>
-    </p:extLst>
-  </p:cSld>
-  <p:clrMapOvr>
-    <a:masterClrMapping/>
-  </p:clrMapOvr>
-</p:sld>
-</file>
-
-<file path=ppt/slides/slide27.xml><?xml version="1.0" encoding="utf-8"?>
-<p:sld xmlns:a="http://schemas.openxmlformats.org/drawingml/2006/main" xmlns:r="http://schemas.openxmlformats.org/officeDocument/2006/relationships" xmlns:p="http://schemas.openxmlformats.org/presentationml/2006/main">
-  <p:cSld>
-    <p:spTree>
-      <p:nvGrpSpPr>
-        <p:cNvPr id="1" name=""/>
-        <p:cNvGrpSpPr/>
-        <p:nvPr/>
-      </p:nvGrpSpPr>
-      <p:grpSpPr>
-        <a:xfrm>
-          <a:off x="0" y="0"/>
-          <a:ext cx="0" cy="0"/>
-          <a:chOff x="0" y="0"/>
-          <a:chExt cx="0" cy="0"/>
-        </a:xfrm>
-      </p:grpSpPr>
-      <p:sp>
-        <p:nvSpPr>
-          <p:cNvPr id="2" name="Title 1">
-            <a:extLst>
-              <a:ext uri="{FF2B5EF4-FFF2-40B4-BE49-F238E27FC236}">
-                <a16:creationId xmlns:a16="http://schemas.microsoft.com/office/drawing/2014/main" id="{FBADB1E8-4BBF-BEAB-1A48-EA65D7C5468D}"/>
-              </a:ext>
-            </a:extLst>
-          </p:cNvPr>
-          <p:cNvSpPr>
-            <a:spLocks noGrp="1"/>
-          </p:cNvSpPr>
-          <p:nvPr>
-            <p:ph type="title"/>
-          </p:nvPr>
-        </p:nvSpPr>
-        <p:spPr/>
-        <p:txBody>
-          <a:bodyPr/>
-          <a:lstStyle/>
-          <a:p>
-            <a:r>
-              <a:rPr lang="en-US" dirty="0"/>
-              <a:t>Common Analysis Methods:</a:t>
-            </a:r>
-            <a:br>
-              <a:rPr lang="en-US" dirty="0"/>
-            </a:br>
-            <a:r>
-              <a:rPr lang="en-US" dirty="0"/>
-              <a:t>Logistic Regression</a:t>
-            </a:r>
-          </a:p>
-        </p:txBody>
-      </p:sp>
-      <p:sp>
-        <p:nvSpPr>
-          <p:cNvPr id="3" name="Content Placeholder 2">
-            <a:extLst>
-              <a:ext uri="{FF2B5EF4-FFF2-40B4-BE49-F238E27FC236}">
-                <a16:creationId xmlns:a16="http://schemas.microsoft.com/office/drawing/2014/main" id="{08055FD4-5E29-152C-3804-971330D0DF67}"/>
-              </a:ext>
-            </a:extLst>
-          </p:cNvPr>
-          <p:cNvSpPr>
-            <a:spLocks noGrp="1"/>
-          </p:cNvSpPr>
-          <p:nvPr>
-            <p:ph idx="1"/>
-          </p:nvPr>
-        </p:nvSpPr>
-        <p:spPr/>
-        <p:txBody>
-          <a:bodyPr/>
-          <a:lstStyle/>
-          <a:p>
-            <a:endParaRPr lang="en-US"/>
-          </a:p>
-        </p:txBody>
-      </p:sp>
-    </p:spTree>
-    <p:extLst>
-      <p:ext uri="{BB962C8B-B14F-4D97-AF65-F5344CB8AC3E}">
-        <p14:creationId xmlns:p14="http://schemas.microsoft.com/office/powerpoint/2010/main" val="1014220470"/>
-      </p:ext>
-    </p:extLst>
-  </p:cSld>
-  <p:clrMapOvr>
-    <a:masterClrMapping/>
-  </p:clrMapOvr>
-</p:sld>
-</file>
-
-<file path=ppt/slides/slide28.xml><?xml version="1.0" encoding="utf-8"?>
-<p:sld xmlns:a="http://schemas.openxmlformats.org/drawingml/2006/main" xmlns:r="http://schemas.openxmlformats.org/officeDocument/2006/relationships" xmlns:p="http://schemas.openxmlformats.org/presentationml/2006/main">
-  <p:cSld>
-    <p:spTree>
-      <p:nvGrpSpPr>
-        <p:cNvPr id="1" name=""/>
-        <p:cNvGrpSpPr/>
-        <p:nvPr/>
-      </p:nvGrpSpPr>
-      <p:grpSpPr>
-        <a:xfrm>
-          <a:off x="0" y="0"/>
-          <a:ext cx="0" cy="0"/>
-          <a:chOff x="0" y="0"/>
-          <a:chExt cx="0" cy="0"/>
-        </a:xfrm>
-      </p:grpSpPr>
-      <p:sp>
-        <p:nvSpPr>
-          <p:cNvPr id="2" name="Title 1">
-            <a:extLst>
-              <a:ext uri="{FF2B5EF4-FFF2-40B4-BE49-F238E27FC236}">
-                <a16:creationId xmlns:a16="http://schemas.microsoft.com/office/drawing/2014/main" id="{6F3ACBE6-31F3-EB4D-A78C-E8BB987E3464}"/>
-              </a:ext>
-            </a:extLst>
-          </p:cNvPr>
-          <p:cNvSpPr>
-            <a:spLocks noGrp="1"/>
-          </p:cNvSpPr>
-          <p:nvPr>
-            <p:ph type="title"/>
-          </p:nvPr>
-        </p:nvSpPr>
-        <p:spPr/>
-        <p:txBody>
-          <a:bodyPr/>
-          <a:lstStyle/>
-          <a:p>
-            <a:r>
-              <a:rPr lang="en-US" dirty="0"/>
-              <a:t>Common Analysis Methods:</a:t>
-            </a:r>
-            <a:br>
-              <a:rPr lang="en-US" dirty="0"/>
-            </a:br>
-            <a:r>
-              <a:rPr lang="en-US" dirty="0"/>
-              <a:t>ANOVA &amp; GMLs</a:t>
-            </a:r>
-          </a:p>
-        </p:txBody>
-      </p:sp>
-      <p:sp>
-        <p:nvSpPr>
-          <p:cNvPr id="3" name="Content Placeholder 2">
-            <a:extLst>
-              <a:ext uri="{FF2B5EF4-FFF2-40B4-BE49-F238E27FC236}">
-                <a16:creationId xmlns:a16="http://schemas.microsoft.com/office/drawing/2014/main" id="{54579DCA-10E4-4926-E807-CFC3A166AB3B}"/>
-              </a:ext>
-            </a:extLst>
-          </p:cNvPr>
-          <p:cNvSpPr>
-            <a:spLocks noGrp="1"/>
-          </p:cNvSpPr>
-          <p:nvPr>
-            <p:ph idx="1"/>
-          </p:nvPr>
-        </p:nvSpPr>
-        <p:spPr/>
-        <p:txBody>
-          <a:bodyPr/>
-          <a:lstStyle/>
-          <a:p>
-            <a:endParaRPr lang="en-US"/>
-          </a:p>
-        </p:txBody>
-      </p:sp>
-    </p:spTree>
-    <p:extLst>
-      <p:ext uri="{BB962C8B-B14F-4D97-AF65-F5344CB8AC3E}">
-        <p14:creationId xmlns:p14="http://schemas.microsoft.com/office/powerpoint/2010/main" val="3038550759"/>
-      </p:ext>
-    </p:extLst>
-  </p:cSld>
-  <p:clrMapOvr>
-    <a:masterClrMapping/>
-  </p:clrMapOvr>
-</p:sld>
-</file>
-
-<file path=ppt/slides/slide29.xml><?xml version="1.0" encoding="utf-8"?>
-<p:sld xmlns:a="http://schemas.openxmlformats.org/drawingml/2006/main" xmlns:r="http://schemas.openxmlformats.org/officeDocument/2006/relationships" xmlns:p="http://schemas.openxmlformats.org/presentationml/2006/main">
-  <p:cSld>
-    <p:spTree>
-      <p:nvGrpSpPr>
-        <p:cNvPr id="1" name=""/>
-        <p:cNvGrpSpPr/>
-        <p:nvPr/>
-      </p:nvGrpSpPr>
-      <p:grpSpPr>
-        <a:xfrm>
-          <a:off x="0" y="0"/>
-          <a:ext cx="0" cy="0"/>
-          <a:chOff x="0" y="0"/>
-          <a:chExt cx="0" cy="0"/>
-        </a:xfrm>
-      </p:grpSpPr>
-      <p:sp>
-        <p:nvSpPr>
-          <p:cNvPr id="2" name="Title 1">
-            <a:extLst>
-              <a:ext uri="{FF2B5EF4-FFF2-40B4-BE49-F238E27FC236}">
-                <a16:creationId xmlns:a16="http://schemas.microsoft.com/office/drawing/2014/main" id="{934E0718-33D7-C9E3-C806-FB131E63AA52}"/>
-              </a:ext>
-            </a:extLst>
-          </p:cNvPr>
-          <p:cNvSpPr>
-            <a:spLocks noGrp="1"/>
-          </p:cNvSpPr>
-          <p:nvPr>
-            <p:ph type="title"/>
-          </p:nvPr>
-        </p:nvSpPr>
-        <p:spPr/>
-        <p:txBody>
-          <a:bodyPr/>
-          <a:lstStyle/>
-          <a:p>
-            <a:r>
-              <a:rPr lang="en-US" dirty="0"/>
-              <a:t>Common Analysis Methods:</a:t>
-            </a:r>
-            <a:br>
-              <a:rPr lang="en-US" dirty="0"/>
-            </a:br>
-            <a:r>
-              <a:rPr lang="en-US" dirty="0"/>
-              <a:t>Multiple Comparisons</a:t>
-            </a:r>
-          </a:p>
-        </p:txBody>
-      </p:sp>
-      <p:sp>
-        <p:nvSpPr>
-          <p:cNvPr id="3" name="Content Placeholder 2">
-            <a:extLst>
-              <a:ext uri="{FF2B5EF4-FFF2-40B4-BE49-F238E27FC236}">
-                <a16:creationId xmlns:a16="http://schemas.microsoft.com/office/drawing/2014/main" id="{94005DF5-BDE7-79B2-29EA-8E37502DE604}"/>
-              </a:ext>
-            </a:extLst>
-          </p:cNvPr>
-          <p:cNvSpPr>
-            <a:spLocks noGrp="1"/>
-          </p:cNvSpPr>
-          <p:nvPr>
-            <p:ph idx="1"/>
-          </p:nvPr>
-        </p:nvSpPr>
-        <p:spPr/>
-        <p:txBody>
-          <a:bodyPr/>
-          <a:lstStyle/>
-          <a:p>
-            <a:endParaRPr lang="en-US"/>
-          </a:p>
-        </p:txBody>
-      </p:sp>
-    </p:spTree>
-    <p:extLst>
-      <p:ext uri="{BB962C8B-B14F-4D97-AF65-F5344CB8AC3E}">
-        <p14:creationId xmlns:p14="http://schemas.microsoft.com/office/powerpoint/2010/main" val="3552984019"/>
       </p:ext>
     </p:extLst>
   </p:cSld>
@@ -21793,6 +23377,276 @@
           <p:cNvPr id="2" name="Title 1">
             <a:extLst>
               <a:ext uri="{FF2B5EF4-FFF2-40B4-BE49-F238E27FC236}">
+                <a16:creationId xmlns:a16="http://schemas.microsoft.com/office/drawing/2014/main" id="{FBADB1E8-4BBF-BEAB-1A48-EA65D7C5468D}"/>
+              </a:ext>
+            </a:extLst>
+          </p:cNvPr>
+          <p:cNvSpPr>
+            <a:spLocks noGrp="1"/>
+          </p:cNvSpPr>
+          <p:nvPr>
+            <p:ph type="title"/>
+          </p:nvPr>
+        </p:nvSpPr>
+        <p:spPr/>
+        <p:txBody>
+          <a:bodyPr/>
+          <a:lstStyle/>
+          <a:p>
+            <a:r>
+              <a:rPr lang="en-US" dirty="0"/>
+              <a:t>Common Analysis Methods:</a:t>
+            </a:r>
+            <a:br>
+              <a:rPr lang="en-US" dirty="0"/>
+            </a:br>
+            <a:r>
+              <a:rPr lang="en-US" dirty="0"/>
+              <a:t>Logistic Regression</a:t>
+            </a:r>
+          </a:p>
+        </p:txBody>
+      </p:sp>
+      <p:sp>
+        <p:nvSpPr>
+          <p:cNvPr id="3" name="Content Placeholder 2">
+            <a:extLst>
+              <a:ext uri="{FF2B5EF4-FFF2-40B4-BE49-F238E27FC236}">
+                <a16:creationId xmlns:a16="http://schemas.microsoft.com/office/drawing/2014/main" id="{08055FD4-5E29-152C-3804-971330D0DF67}"/>
+              </a:ext>
+            </a:extLst>
+          </p:cNvPr>
+          <p:cNvSpPr>
+            <a:spLocks noGrp="1"/>
+          </p:cNvSpPr>
+          <p:nvPr>
+            <p:ph idx="1"/>
+          </p:nvPr>
+        </p:nvSpPr>
+        <p:spPr/>
+        <p:txBody>
+          <a:bodyPr/>
+          <a:lstStyle/>
+          <a:p>
+            <a:endParaRPr lang="en-US"/>
+          </a:p>
+        </p:txBody>
+      </p:sp>
+    </p:spTree>
+    <p:extLst>
+      <p:ext uri="{BB962C8B-B14F-4D97-AF65-F5344CB8AC3E}">
+        <p14:creationId xmlns:p14="http://schemas.microsoft.com/office/powerpoint/2010/main" val="1014220470"/>
+      </p:ext>
+    </p:extLst>
+  </p:cSld>
+  <p:clrMapOvr>
+    <a:masterClrMapping/>
+  </p:clrMapOvr>
+</p:sld>
+</file>
+
+<file path=ppt/slides/slide31.xml><?xml version="1.0" encoding="utf-8"?>
+<p:sld xmlns:a="http://schemas.openxmlformats.org/drawingml/2006/main" xmlns:r="http://schemas.openxmlformats.org/officeDocument/2006/relationships" xmlns:p="http://schemas.openxmlformats.org/presentationml/2006/main">
+  <p:cSld>
+    <p:spTree>
+      <p:nvGrpSpPr>
+        <p:cNvPr id="1" name=""/>
+        <p:cNvGrpSpPr/>
+        <p:nvPr/>
+      </p:nvGrpSpPr>
+      <p:grpSpPr>
+        <a:xfrm>
+          <a:off x="0" y="0"/>
+          <a:ext cx="0" cy="0"/>
+          <a:chOff x="0" y="0"/>
+          <a:chExt cx="0" cy="0"/>
+        </a:xfrm>
+      </p:grpSpPr>
+      <p:sp>
+        <p:nvSpPr>
+          <p:cNvPr id="2" name="Title 1">
+            <a:extLst>
+              <a:ext uri="{FF2B5EF4-FFF2-40B4-BE49-F238E27FC236}">
+                <a16:creationId xmlns:a16="http://schemas.microsoft.com/office/drawing/2014/main" id="{6F3ACBE6-31F3-EB4D-A78C-E8BB987E3464}"/>
+              </a:ext>
+            </a:extLst>
+          </p:cNvPr>
+          <p:cNvSpPr>
+            <a:spLocks noGrp="1"/>
+          </p:cNvSpPr>
+          <p:nvPr>
+            <p:ph type="title"/>
+          </p:nvPr>
+        </p:nvSpPr>
+        <p:spPr/>
+        <p:txBody>
+          <a:bodyPr/>
+          <a:lstStyle/>
+          <a:p>
+            <a:r>
+              <a:rPr lang="en-US" dirty="0"/>
+              <a:t>Common Analysis Methods:</a:t>
+            </a:r>
+            <a:br>
+              <a:rPr lang="en-US" dirty="0"/>
+            </a:br>
+            <a:r>
+              <a:rPr lang="en-US" dirty="0"/>
+              <a:t>ANOVA &amp; GMLs</a:t>
+            </a:r>
+          </a:p>
+        </p:txBody>
+      </p:sp>
+      <p:sp>
+        <p:nvSpPr>
+          <p:cNvPr id="3" name="Content Placeholder 2">
+            <a:extLst>
+              <a:ext uri="{FF2B5EF4-FFF2-40B4-BE49-F238E27FC236}">
+                <a16:creationId xmlns:a16="http://schemas.microsoft.com/office/drawing/2014/main" id="{54579DCA-10E4-4926-E807-CFC3A166AB3B}"/>
+              </a:ext>
+            </a:extLst>
+          </p:cNvPr>
+          <p:cNvSpPr>
+            <a:spLocks noGrp="1"/>
+          </p:cNvSpPr>
+          <p:nvPr>
+            <p:ph idx="1"/>
+          </p:nvPr>
+        </p:nvSpPr>
+        <p:spPr/>
+        <p:txBody>
+          <a:bodyPr/>
+          <a:lstStyle/>
+          <a:p>
+            <a:endParaRPr lang="en-US"/>
+          </a:p>
+        </p:txBody>
+      </p:sp>
+    </p:spTree>
+    <p:extLst>
+      <p:ext uri="{BB962C8B-B14F-4D97-AF65-F5344CB8AC3E}">
+        <p14:creationId xmlns:p14="http://schemas.microsoft.com/office/powerpoint/2010/main" val="3038550759"/>
+      </p:ext>
+    </p:extLst>
+  </p:cSld>
+  <p:clrMapOvr>
+    <a:masterClrMapping/>
+  </p:clrMapOvr>
+</p:sld>
+</file>
+
+<file path=ppt/slides/slide32.xml><?xml version="1.0" encoding="utf-8"?>
+<p:sld xmlns:a="http://schemas.openxmlformats.org/drawingml/2006/main" xmlns:r="http://schemas.openxmlformats.org/officeDocument/2006/relationships" xmlns:p="http://schemas.openxmlformats.org/presentationml/2006/main">
+  <p:cSld>
+    <p:spTree>
+      <p:nvGrpSpPr>
+        <p:cNvPr id="1" name=""/>
+        <p:cNvGrpSpPr/>
+        <p:nvPr/>
+      </p:nvGrpSpPr>
+      <p:grpSpPr>
+        <a:xfrm>
+          <a:off x="0" y="0"/>
+          <a:ext cx="0" cy="0"/>
+          <a:chOff x="0" y="0"/>
+          <a:chExt cx="0" cy="0"/>
+        </a:xfrm>
+      </p:grpSpPr>
+      <p:sp>
+        <p:nvSpPr>
+          <p:cNvPr id="2" name="Title 1">
+            <a:extLst>
+              <a:ext uri="{FF2B5EF4-FFF2-40B4-BE49-F238E27FC236}">
+                <a16:creationId xmlns:a16="http://schemas.microsoft.com/office/drawing/2014/main" id="{934E0718-33D7-C9E3-C806-FB131E63AA52}"/>
+              </a:ext>
+            </a:extLst>
+          </p:cNvPr>
+          <p:cNvSpPr>
+            <a:spLocks noGrp="1"/>
+          </p:cNvSpPr>
+          <p:nvPr>
+            <p:ph type="title"/>
+          </p:nvPr>
+        </p:nvSpPr>
+        <p:spPr/>
+        <p:txBody>
+          <a:bodyPr/>
+          <a:lstStyle/>
+          <a:p>
+            <a:r>
+              <a:rPr lang="en-US" dirty="0"/>
+              <a:t>Common Analysis Methods:</a:t>
+            </a:r>
+            <a:br>
+              <a:rPr lang="en-US" dirty="0"/>
+            </a:br>
+            <a:r>
+              <a:rPr lang="en-US" dirty="0"/>
+              <a:t>Multiple Comparisons</a:t>
+            </a:r>
+          </a:p>
+        </p:txBody>
+      </p:sp>
+      <p:sp>
+        <p:nvSpPr>
+          <p:cNvPr id="3" name="Content Placeholder 2">
+            <a:extLst>
+              <a:ext uri="{FF2B5EF4-FFF2-40B4-BE49-F238E27FC236}">
+                <a16:creationId xmlns:a16="http://schemas.microsoft.com/office/drawing/2014/main" id="{94005DF5-BDE7-79B2-29EA-8E37502DE604}"/>
+              </a:ext>
+            </a:extLst>
+          </p:cNvPr>
+          <p:cNvSpPr>
+            <a:spLocks noGrp="1"/>
+          </p:cNvSpPr>
+          <p:nvPr>
+            <p:ph idx="1"/>
+          </p:nvPr>
+        </p:nvSpPr>
+        <p:spPr/>
+        <p:txBody>
+          <a:bodyPr/>
+          <a:lstStyle/>
+          <a:p>
+            <a:endParaRPr lang="en-US"/>
+          </a:p>
+        </p:txBody>
+      </p:sp>
+    </p:spTree>
+    <p:extLst>
+      <p:ext uri="{BB962C8B-B14F-4D97-AF65-F5344CB8AC3E}">
+        <p14:creationId xmlns:p14="http://schemas.microsoft.com/office/powerpoint/2010/main" val="3552984019"/>
+      </p:ext>
+    </p:extLst>
+  </p:cSld>
+  <p:clrMapOvr>
+    <a:masterClrMapping/>
+  </p:clrMapOvr>
+</p:sld>
+</file>
+
+<file path=ppt/slides/slide33.xml><?xml version="1.0" encoding="utf-8"?>
+<p:sld xmlns:a="http://schemas.openxmlformats.org/drawingml/2006/main" xmlns:r="http://schemas.openxmlformats.org/officeDocument/2006/relationships" xmlns:p="http://schemas.openxmlformats.org/presentationml/2006/main">
+  <p:cSld>
+    <p:spTree>
+      <p:nvGrpSpPr>
+        <p:cNvPr id="1" name=""/>
+        <p:cNvGrpSpPr/>
+        <p:nvPr/>
+      </p:nvGrpSpPr>
+      <p:grpSpPr>
+        <a:xfrm>
+          <a:off x="0" y="0"/>
+          <a:ext cx="0" cy="0"/>
+          <a:chOff x="0" y="0"/>
+          <a:chExt cx="0" cy="0"/>
+        </a:xfrm>
+      </p:grpSpPr>
+      <p:sp>
+        <p:nvSpPr>
+          <p:cNvPr id="2" name="Title 1">
+            <a:extLst>
+              <a:ext uri="{FF2B5EF4-FFF2-40B4-BE49-F238E27FC236}">
                 <a16:creationId xmlns:a16="http://schemas.microsoft.com/office/drawing/2014/main" id="{3245AC95-950E-0230-B674-F3C8F2E79C70}"/>
               </a:ext>
             </a:extLst>
@@ -21857,7 +23711,7 @@
 </p:sld>
 </file>
 
-<file path=ppt/slides/slide31.xml><?xml version="1.0" encoding="utf-8"?>
+<file path=ppt/slides/slide34.xml><?xml version="1.0" encoding="utf-8"?>
 <p:sld xmlns:a="http://schemas.openxmlformats.org/drawingml/2006/main" xmlns:r="http://schemas.openxmlformats.org/officeDocument/2006/relationships" xmlns:p="http://schemas.openxmlformats.org/presentationml/2006/main">
   <p:cSld>
     <p:bg>
@@ -21948,7 +23802,7 @@
 </p:sld>
 </file>
 
-<file path=ppt/slides/slide32.xml><?xml version="1.0" encoding="utf-8"?>
+<file path=ppt/slides/slide35.xml><?xml version="1.0" encoding="utf-8"?>
 <p:sld xmlns:a="http://schemas.openxmlformats.org/drawingml/2006/main" xmlns:r="http://schemas.openxmlformats.org/officeDocument/2006/relationships" xmlns:p="http://schemas.openxmlformats.org/presentationml/2006/main">
   <p:cSld>
     <p:spTree>
@@ -22031,7 +23885,7 @@
 </p:sld>
 </file>
 
-<file path=ppt/slides/slide33.xml><?xml version="1.0" encoding="utf-8"?>
+<file path=ppt/slides/slide36.xml><?xml version="1.0" encoding="utf-8"?>
 <p:sld xmlns:a="http://schemas.openxmlformats.org/drawingml/2006/main" xmlns:r="http://schemas.openxmlformats.org/officeDocument/2006/relationships" xmlns:p="http://schemas.openxmlformats.org/presentationml/2006/main">
   <p:cSld>
     <p:spTree>
@@ -22121,7 +23975,7 @@
 </p:sld>
 </file>
 
-<file path=ppt/slides/slide34.xml><?xml version="1.0" encoding="utf-8"?>
+<file path=ppt/slides/slide37.xml><?xml version="1.0" encoding="utf-8"?>
 <p:sld xmlns:a="http://schemas.openxmlformats.org/drawingml/2006/main" xmlns:r="http://schemas.openxmlformats.org/officeDocument/2006/relationships" xmlns:p="http://schemas.openxmlformats.org/presentationml/2006/main">
   <p:cSld>
     <p:spTree>
@@ -22211,7 +24065,7 @@
 </p:sld>
 </file>
 
-<file path=ppt/slides/slide35.xml><?xml version="1.0" encoding="utf-8"?>
+<file path=ppt/slides/slide38.xml><?xml version="1.0" encoding="utf-8"?>
 <p:sld xmlns:a="http://schemas.openxmlformats.org/drawingml/2006/main" xmlns:r="http://schemas.openxmlformats.org/officeDocument/2006/relationships" xmlns:p="http://schemas.openxmlformats.org/presentationml/2006/main">
   <p:cSld>
     <p:spTree>
@@ -22294,7 +24148,7 @@
 </p:sld>
 </file>
 
-<file path=ppt/slides/slide36.xml><?xml version="1.0" encoding="utf-8"?>
+<file path=ppt/slides/slide39.xml><?xml version="1.0" encoding="utf-8"?>
 <p:sld xmlns:a="http://schemas.openxmlformats.org/drawingml/2006/main" xmlns:r="http://schemas.openxmlformats.org/officeDocument/2006/relationships" xmlns:p="http://schemas.openxmlformats.org/presentationml/2006/main">
   <p:cSld>
     <p:spTree>
@@ -22375,272 +24229,6 @@
     <p:extLst>
       <p:ext uri="{BB962C8B-B14F-4D97-AF65-F5344CB8AC3E}">
         <p14:creationId xmlns:p14="http://schemas.microsoft.com/office/powerpoint/2010/main" val="528746526"/>
-      </p:ext>
-    </p:extLst>
-  </p:cSld>
-  <p:clrMapOvr>
-    <a:masterClrMapping/>
-  </p:clrMapOvr>
-</p:sld>
-</file>
-
-<file path=ppt/slides/slide37.xml><?xml version="1.0" encoding="utf-8"?>
-<p:sld xmlns:a="http://schemas.openxmlformats.org/drawingml/2006/main" xmlns:r="http://schemas.openxmlformats.org/officeDocument/2006/relationships" xmlns:p="http://schemas.openxmlformats.org/presentationml/2006/main">
-  <p:cSld>
-    <p:spTree>
-      <p:nvGrpSpPr>
-        <p:cNvPr id="1" name=""/>
-        <p:cNvGrpSpPr/>
-        <p:nvPr/>
-      </p:nvGrpSpPr>
-      <p:grpSpPr>
-        <a:xfrm>
-          <a:off x="0" y="0"/>
-          <a:ext cx="0" cy="0"/>
-          <a:chOff x="0" y="0"/>
-          <a:chExt cx="0" cy="0"/>
-        </a:xfrm>
-      </p:grpSpPr>
-      <p:sp>
-        <p:nvSpPr>
-          <p:cNvPr id="2" name="Title 1">
-            <a:extLst>
-              <a:ext uri="{FF2B5EF4-FFF2-40B4-BE49-F238E27FC236}">
-                <a16:creationId xmlns:a16="http://schemas.microsoft.com/office/drawing/2014/main" id="{5AAC1096-A798-A96C-CB9F-DC2E10A03AF2}"/>
-              </a:ext>
-            </a:extLst>
-          </p:cNvPr>
-          <p:cNvSpPr>
-            <a:spLocks noGrp="1"/>
-          </p:cNvSpPr>
-          <p:nvPr>
-            <p:ph type="title"/>
-          </p:nvPr>
-        </p:nvSpPr>
-        <p:spPr/>
-        <p:txBody>
-          <a:bodyPr/>
-          <a:lstStyle/>
-          <a:p>
-            <a:r>
-              <a:rPr lang="en-US" dirty="0"/>
-              <a:t>Activity 4: Data Visualization</a:t>
-            </a:r>
-          </a:p>
-        </p:txBody>
-      </p:sp>
-      <p:sp>
-        <p:nvSpPr>
-          <p:cNvPr id="3" name="Content Placeholder 2">
-            <a:extLst>
-              <a:ext uri="{FF2B5EF4-FFF2-40B4-BE49-F238E27FC236}">
-                <a16:creationId xmlns:a16="http://schemas.microsoft.com/office/drawing/2014/main" id="{4768F9F4-5036-2748-AA3A-669BB0A38EE8}"/>
-              </a:ext>
-            </a:extLst>
-          </p:cNvPr>
-          <p:cNvSpPr>
-            <a:spLocks noGrp="1"/>
-          </p:cNvSpPr>
-          <p:nvPr>
-            <p:ph idx="1"/>
-          </p:nvPr>
-        </p:nvSpPr>
-        <p:spPr/>
-        <p:txBody>
-          <a:bodyPr/>
-          <a:lstStyle/>
-          <a:p>
-            <a:r>
-              <a:rPr lang="en-US" dirty="0"/>
-              <a:t>Design and create visualization with real genomic data</a:t>
-            </a:r>
-          </a:p>
-          <a:p>
-            <a:r>
-              <a:rPr lang="en-US" dirty="0"/>
-              <a:t>Group discussion on best practices and interpretation</a:t>
-            </a:r>
-          </a:p>
-        </p:txBody>
-      </p:sp>
-    </p:spTree>
-    <p:extLst>
-      <p:ext uri="{BB962C8B-B14F-4D97-AF65-F5344CB8AC3E}">
-        <p14:creationId xmlns:p14="http://schemas.microsoft.com/office/powerpoint/2010/main" val="1693870170"/>
-      </p:ext>
-    </p:extLst>
-  </p:cSld>
-  <p:clrMapOvr>
-    <a:masterClrMapping/>
-  </p:clrMapOvr>
-</p:sld>
-</file>
-
-<file path=ppt/slides/slide38.xml><?xml version="1.0" encoding="utf-8"?>
-<p:sld xmlns:a="http://schemas.openxmlformats.org/drawingml/2006/main" xmlns:r="http://schemas.openxmlformats.org/officeDocument/2006/relationships" xmlns:p="http://schemas.openxmlformats.org/presentationml/2006/main">
-  <p:cSld>
-    <p:bg>
-      <p:bgPr>
-        <a:solidFill>
-          <a:schemeClr val="accent3"/>
-        </a:solidFill>
-        <a:effectLst/>
-      </p:bgPr>
-    </p:bg>
-    <p:spTree>
-      <p:nvGrpSpPr>
-        <p:cNvPr id="1" name=""/>
-        <p:cNvGrpSpPr/>
-        <p:nvPr/>
-      </p:nvGrpSpPr>
-      <p:grpSpPr>
-        <a:xfrm>
-          <a:off x="0" y="0"/>
-          <a:ext cx="0" cy="0"/>
-          <a:chOff x="0" y="0"/>
-          <a:chExt cx="0" cy="0"/>
-        </a:xfrm>
-      </p:grpSpPr>
-      <p:sp>
-        <p:nvSpPr>
-          <p:cNvPr id="2" name="Title 1">
-            <a:extLst>
-              <a:ext uri="{FF2B5EF4-FFF2-40B4-BE49-F238E27FC236}">
-                <a16:creationId xmlns:a16="http://schemas.microsoft.com/office/drawing/2014/main" id="{8260B8BC-1A26-8153-A32F-CED5E2950CCF}"/>
-              </a:ext>
-            </a:extLst>
-          </p:cNvPr>
-          <p:cNvSpPr>
-            <a:spLocks noGrp="1"/>
-          </p:cNvSpPr>
-          <p:nvPr>
-            <p:ph type="title"/>
-          </p:nvPr>
-        </p:nvSpPr>
-        <p:spPr/>
-        <p:txBody>
-          <a:bodyPr/>
-          <a:lstStyle/>
-          <a:p>
-            <a:r>
-              <a:rPr lang="en-US" dirty="0"/>
-              <a:t>Ethical Considerations and Challenges</a:t>
-            </a:r>
-          </a:p>
-        </p:txBody>
-      </p:sp>
-      <p:sp>
-        <p:nvSpPr>
-          <p:cNvPr id="3" name="Text Placeholder 2">
-            <a:extLst>
-              <a:ext uri="{FF2B5EF4-FFF2-40B4-BE49-F238E27FC236}">
-                <a16:creationId xmlns:a16="http://schemas.microsoft.com/office/drawing/2014/main" id="{E0964D4F-5C63-97C9-8907-4FD74B3A1F38}"/>
-              </a:ext>
-            </a:extLst>
-          </p:cNvPr>
-          <p:cNvSpPr>
-            <a:spLocks noGrp="1"/>
-          </p:cNvSpPr>
-          <p:nvPr>
-            <p:ph type="body" idx="1"/>
-          </p:nvPr>
-        </p:nvSpPr>
-        <p:spPr/>
-        <p:txBody>
-          <a:bodyPr/>
-          <a:lstStyle/>
-          <a:p>
-            <a:endParaRPr lang="en-US"/>
-          </a:p>
-        </p:txBody>
-      </p:sp>
-    </p:spTree>
-    <p:extLst>
-      <p:ext uri="{BB962C8B-B14F-4D97-AF65-F5344CB8AC3E}">
-        <p14:creationId xmlns:p14="http://schemas.microsoft.com/office/powerpoint/2010/main" val="4231344819"/>
-      </p:ext>
-    </p:extLst>
-  </p:cSld>
-  <p:clrMapOvr>
-    <a:masterClrMapping/>
-  </p:clrMapOvr>
-</p:sld>
-</file>
-
-<file path=ppt/slides/slide39.xml><?xml version="1.0" encoding="utf-8"?>
-<p:sld xmlns:a="http://schemas.openxmlformats.org/drawingml/2006/main" xmlns:r="http://schemas.openxmlformats.org/officeDocument/2006/relationships" xmlns:p="http://schemas.openxmlformats.org/presentationml/2006/main">
-  <p:cSld>
-    <p:spTree>
-      <p:nvGrpSpPr>
-        <p:cNvPr id="1" name=""/>
-        <p:cNvGrpSpPr/>
-        <p:nvPr/>
-      </p:nvGrpSpPr>
-      <p:grpSpPr>
-        <a:xfrm>
-          <a:off x="0" y="0"/>
-          <a:ext cx="0" cy="0"/>
-          <a:chOff x="0" y="0"/>
-          <a:chExt cx="0" cy="0"/>
-        </a:xfrm>
-      </p:grpSpPr>
-      <p:sp>
-        <p:nvSpPr>
-          <p:cNvPr id="2" name="Title 1">
-            <a:extLst>
-              <a:ext uri="{FF2B5EF4-FFF2-40B4-BE49-F238E27FC236}">
-                <a16:creationId xmlns:a16="http://schemas.microsoft.com/office/drawing/2014/main" id="{F2B70C2A-8566-8A5E-9A13-67BD7E962126}"/>
-              </a:ext>
-            </a:extLst>
-          </p:cNvPr>
-          <p:cNvSpPr>
-            <a:spLocks noGrp="1"/>
-          </p:cNvSpPr>
-          <p:nvPr>
-            <p:ph type="title"/>
-          </p:nvPr>
-        </p:nvSpPr>
-        <p:spPr/>
-        <p:txBody>
-          <a:bodyPr/>
-          <a:lstStyle/>
-          <a:p>
-            <a:r>
-              <a:rPr lang="en-US" dirty="0"/>
-              <a:t>Ethics of Handling and Analyzing Biological Data</a:t>
-            </a:r>
-          </a:p>
-        </p:txBody>
-      </p:sp>
-      <p:sp>
-        <p:nvSpPr>
-          <p:cNvPr id="3" name="Content Placeholder 2">
-            <a:extLst>
-              <a:ext uri="{FF2B5EF4-FFF2-40B4-BE49-F238E27FC236}">
-                <a16:creationId xmlns:a16="http://schemas.microsoft.com/office/drawing/2014/main" id="{1997DAF0-86BC-828A-A534-1D0AD72659A1}"/>
-              </a:ext>
-            </a:extLst>
-          </p:cNvPr>
-          <p:cNvSpPr>
-            <a:spLocks noGrp="1"/>
-          </p:cNvSpPr>
-          <p:nvPr>
-            <p:ph idx="1"/>
-          </p:nvPr>
-        </p:nvSpPr>
-        <p:spPr/>
-        <p:txBody>
-          <a:bodyPr/>
-          <a:lstStyle/>
-          <a:p>
-            <a:endParaRPr lang="en-US"/>
-          </a:p>
-        </p:txBody>
-      </p:sp>
-    </p:spTree>
-    <p:extLst>
-      <p:ext uri="{BB962C8B-B14F-4D97-AF65-F5344CB8AC3E}">
-        <p14:creationId xmlns:p14="http://schemas.microsoft.com/office/powerpoint/2010/main" val="4010374346"/>
       </p:ext>
     </p:extLst>
   </p:cSld>
@@ -22785,6 +24373,272 @@
           <p:cNvPr id="2" name="Title 1">
             <a:extLst>
               <a:ext uri="{FF2B5EF4-FFF2-40B4-BE49-F238E27FC236}">
+                <a16:creationId xmlns:a16="http://schemas.microsoft.com/office/drawing/2014/main" id="{5AAC1096-A798-A96C-CB9F-DC2E10A03AF2}"/>
+              </a:ext>
+            </a:extLst>
+          </p:cNvPr>
+          <p:cNvSpPr>
+            <a:spLocks noGrp="1"/>
+          </p:cNvSpPr>
+          <p:nvPr>
+            <p:ph type="title"/>
+          </p:nvPr>
+        </p:nvSpPr>
+        <p:spPr/>
+        <p:txBody>
+          <a:bodyPr/>
+          <a:lstStyle/>
+          <a:p>
+            <a:r>
+              <a:rPr lang="en-US" dirty="0"/>
+              <a:t>Activity 4: Data Visualization</a:t>
+            </a:r>
+          </a:p>
+        </p:txBody>
+      </p:sp>
+      <p:sp>
+        <p:nvSpPr>
+          <p:cNvPr id="3" name="Content Placeholder 2">
+            <a:extLst>
+              <a:ext uri="{FF2B5EF4-FFF2-40B4-BE49-F238E27FC236}">
+                <a16:creationId xmlns:a16="http://schemas.microsoft.com/office/drawing/2014/main" id="{4768F9F4-5036-2748-AA3A-669BB0A38EE8}"/>
+              </a:ext>
+            </a:extLst>
+          </p:cNvPr>
+          <p:cNvSpPr>
+            <a:spLocks noGrp="1"/>
+          </p:cNvSpPr>
+          <p:nvPr>
+            <p:ph idx="1"/>
+          </p:nvPr>
+        </p:nvSpPr>
+        <p:spPr/>
+        <p:txBody>
+          <a:bodyPr/>
+          <a:lstStyle/>
+          <a:p>
+            <a:r>
+              <a:rPr lang="en-US" dirty="0"/>
+              <a:t>Design and create visualization with real genomic data</a:t>
+            </a:r>
+          </a:p>
+          <a:p>
+            <a:r>
+              <a:rPr lang="en-US" dirty="0"/>
+              <a:t>Group discussion on best practices and interpretation</a:t>
+            </a:r>
+          </a:p>
+        </p:txBody>
+      </p:sp>
+    </p:spTree>
+    <p:extLst>
+      <p:ext uri="{BB962C8B-B14F-4D97-AF65-F5344CB8AC3E}">
+        <p14:creationId xmlns:p14="http://schemas.microsoft.com/office/powerpoint/2010/main" val="1693870170"/>
+      </p:ext>
+    </p:extLst>
+  </p:cSld>
+  <p:clrMapOvr>
+    <a:masterClrMapping/>
+  </p:clrMapOvr>
+</p:sld>
+</file>
+
+<file path=ppt/slides/slide41.xml><?xml version="1.0" encoding="utf-8"?>
+<p:sld xmlns:a="http://schemas.openxmlformats.org/drawingml/2006/main" xmlns:r="http://schemas.openxmlformats.org/officeDocument/2006/relationships" xmlns:p="http://schemas.openxmlformats.org/presentationml/2006/main">
+  <p:cSld>
+    <p:bg>
+      <p:bgPr>
+        <a:solidFill>
+          <a:schemeClr val="accent3"/>
+        </a:solidFill>
+        <a:effectLst/>
+      </p:bgPr>
+    </p:bg>
+    <p:spTree>
+      <p:nvGrpSpPr>
+        <p:cNvPr id="1" name=""/>
+        <p:cNvGrpSpPr/>
+        <p:nvPr/>
+      </p:nvGrpSpPr>
+      <p:grpSpPr>
+        <a:xfrm>
+          <a:off x="0" y="0"/>
+          <a:ext cx="0" cy="0"/>
+          <a:chOff x="0" y="0"/>
+          <a:chExt cx="0" cy="0"/>
+        </a:xfrm>
+      </p:grpSpPr>
+      <p:sp>
+        <p:nvSpPr>
+          <p:cNvPr id="2" name="Title 1">
+            <a:extLst>
+              <a:ext uri="{FF2B5EF4-FFF2-40B4-BE49-F238E27FC236}">
+                <a16:creationId xmlns:a16="http://schemas.microsoft.com/office/drawing/2014/main" id="{8260B8BC-1A26-8153-A32F-CED5E2950CCF}"/>
+              </a:ext>
+            </a:extLst>
+          </p:cNvPr>
+          <p:cNvSpPr>
+            <a:spLocks noGrp="1"/>
+          </p:cNvSpPr>
+          <p:nvPr>
+            <p:ph type="title"/>
+          </p:nvPr>
+        </p:nvSpPr>
+        <p:spPr/>
+        <p:txBody>
+          <a:bodyPr/>
+          <a:lstStyle/>
+          <a:p>
+            <a:r>
+              <a:rPr lang="en-US" dirty="0"/>
+              <a:t>Ethical Considerations and Challenges</a:t>
+            </a:r>
+          </a:p>
+        </p:txBody>
+      </p:sp>
+      <p:sp>
+        <p:nvSpPr>
+          <p:cNvPr id="3" name="Text Placeholder 2">
+            <a:extLst>
+              <a:ext uri="{FF2B5EF4-FFF2-40B4-BE49-F238E27FC236}">
+                <a16:creationId xmlns:a16="http://schemas.microsoft.com/office/drawing/2014/main" id="{E0964D4F-5C63-97C9-8907-4FD74B3A1F38}"/>
+              </a:ext>
+            </a:extLst>
+          </p:cNvPr>
+          <p:cNvSpPr>
+            <a:spLocks noGrp="1"/>
+          </p:cNvSpPr>
+          <p:nvPr>
+            <p:ph type="body" idx="1"/>
+          </p:nvPr>
+        </p:nvSpPr>
+        <p:spPr/>
+        <p:txBody>
+          <a:bodyPr/>
+          <a:lstStyle/>
+          <a:p>
+            <a:endParaRPr lang="en-US"/>
+          </a:p>
+        </p:txBody>
+      </p:sp>
+    </p:spTree>
+    <p:extLst>
+      <p:ext uri="{BB962C8B-B14F-4D97-AF65-F5344CB8AC3E}">
+        <p14:creationId xmlns:p14="http://schemas.microsoft.com/office/powerpoint/2010/main" val="4231344819"/>
+      </p:ext>
+    </p:extLst>
+  </p:cSld>
+  <p:clrMapOvr>
+    <a:masterClrMapping/>
+  </p:clrMapOvr>
+</p:sld>
+</file>
+
+<file path=ppt/slides/slide42.xml><?xml version="1.0" encoding="utf-8"?>
+<p:sld xmlns:a="http://schemas.openxmlformats.org/drawingml/2006/main" xmlns:r="http://schemas.openxmlformats.org/officeDocument/2006/relationships" xmlns:p="http://schemas.openxmlformats.org/presentationml/2006/main">
+  <p:cSld>
+    <p:spTree>
+      <p:nvGrpSpPr>
+        <p:cNvPr id="1" name=""/>
+        <p:cNvGrpSpPr/>
+        <p:nvPr/>
+      </p:nvGrpSpPr>
+      <p:grpSpPr>
+        <a:xfrm>
+          <a:off x="0" y="0"/>
+          <a:ext cx="0" cy="0"/>
+          <a:chOff x="0" y="0"/>
+          <a:chExt cx="0" cy="0"/>
+        </a:xfrm>
+      </p:grpSpPr>
+      <p:sp>
+        <p:nvSpPr>
+          <p:cNvPr id="2" name="Title 1">
+            <a:extLst>
+              <a:ext uri="{FF2B5EF4-FFF2-40B4-BE49-F238E27FC236}">
+                <a16:creationId xmlns:a16="http://schemas.microsoft.com/office/drawing/2014/main" id="{F2B70C2A-8566-8A5E-9A13-67BD7E962126}"/>
+              </a:ext>
+            </a:extLst>
+          </p:cNvPr>
+          <p:cNvSpPr>
+            <a:spLocks noGrp="1"/>
+          </p:cNvSpPr>
+          <p:nvPr>
+            <p:ph type="title"/>
+          </p:nvPr>
+        </p:nvSpPr>
+        <p:spPr/>
+        <p:txBody>
+          <a:bodyPr/>
+          <a:lstStyle/>
+          <a:p>
+            <a:r>
+              <a:rPr lang="en-US" dirty="0"/>
+              <a:t>Ethics of Handling and Analyzing Biological Data</a:t>
+            </a:r>
+          </a:p>
+        </p:txBody>
+      </p:sp>
+      <p:sp>
+        <p:nvSpPr>
+          <p:cNvPr id="3" name="Content Placeholder 2">
+            <a:extLst>
+              <a:ext uri="{FF2B5EF4-FFF2-40B4-BE49-F238E27FC236}">
+                <a16:creationId xmlns:a16="http://schemas.microsoft.com/office/drawing/2014/main" id="{1997DAF0-86BC-828A-A534-1D0AD72659A1}"/>
+              </a:ext>
+            </a:extLst>
+          </p:cNvPr>
+          <p:cNvSpPr>
+            <a:spLocks noGrp="1"/>
+          </p:cNvSpPr>
+          <p:nvPr>
+            <p:ph idx="1"/>
+          </p:nvPr>
+        </p:nvSpPr>
+        <p:spPr/>
+        <p:txBody>
+          <a:bodyPr/>
+          <a:lstStyle/>
+          <a:p>
+            <a:endParaRPr lang="en-US"/>
+          </a:p>
+        </p:txBody>
+      </p:sp>
+    </p:spTree>
+    <p:extLst>
+      <p:ext uri="{BB962C8B-B14F-4D97-AF65-F5344CB8AC3E}">
+        <p14:creationId xmlns:p14="http://schemas.microsoft.com/office/powerpoint/2010/main" val="4010374346"/>
+      </p:ext>
+    </p:extLst>
+  </p:cSld>
+  <p:clrMapOvr>
+    <a:masterClrMapping/>
+  </p:clrMapOvr>
+</p:sld>
+</file>
+
+<file path=ppt/slides/slide43.xml><?xml version="1.0" encoding="utf-8"?>
+<p:sld xmlns:a="http://schemas.openxmlformats.org/drawingml/2006/main" xmlns:r="http://schemas.openxmlformats.org/officeDocument/2006/relationships" xmlns:p="http://schemas.openxmlformats.org/presentationml/2006/main">
+  <p:cSld>
+    <p:spTree>
+      <p:nvGrpSpPr>
+        <p:cNvPr id="1" name=""/>
+        <p:cNvGrpSpPr/>
+        <p:nvPr/>
+      </p:nvGrpSpPr>
+      <p:grpSpPr>
+        <a:xfrm>
+          <a:off x="0" y="0"/>
+          <a:ext cx="0" cy="0"/>
+          <a:chOff x="0" y="0"/>
+          <a:chExt cx="0" cy="0"/>
+        </a:xfrm>
+      </p:grpSpPr>
+      <p:sp>
+        <p:nvSpPr>
+          <p:cNvPr id="2" name="Title 1">
+            <a:extLst>
+              <a:ext uri="{FF2B5EF4-FFF2-40B4-BE49-F238E27FC236}">
                 <a16:creationId xmlns:a16="http://schemas.microsoft.com/office/drawing/2014/main" id="{F2454F4A-93C9-6E68-E602-6F406FB06C20}"/>
               </a:ext>
             </a:extLst>
@@ -22846,7 +24700,7 @@
 </p:sld>
 </file>
 
-<file path=ppt/slides/slide41.xml><?xml version="1.0" encoding="utf-8"?>
+<file path=ppt/slides/slide44.xml><?xml version="1.0" encoding="utf-8"?>
 <p:sld xmlns:a="http://schemas.openxmlformats.org/drawingml/2006/main" xmlns:r="http://schemas.openxmlformats.org/officeDocument/2006/relationships" xmlns:p="http://schemas.openxmlformats.org/presentationml/2006/main">
   <p:cSld>
     <p:bg>
@@ -23171,7 +25025,7 @@
 </p:sld>
 </file>
 
-<file path=ppt/slides/slide42.xml><?xml version="1.0" encoding="utf-8"?>
+<file path=ppt/slides/slide45.xml><?xml version="1.0" encoding="utf-8"?>
 <p:sld xmlns:a="http://schemas.openxmlformats.org/drawingml/2006/main" xmlns:r="http://schemas.openxmlformats.org/officeDocument/2006/relationships" xmlns:p="http://schemas.openxmlformats.org/presentationml/2006/main">
   <p:cSld>
     <p:spTree>
@@ -23211,13 +25065,8 @@
           <a:p>
             <a:r>
               <a:rPr lang="en-US" dirty="0"/>
-              <a:t>Activity 5: Ethical </a:t>
+              <a:t>Activity 5: Ethical Dilemmas</a:t>
             </a:r>
-            <a:r>
-              <a:rPr lang="en-US" dirty="0" err="1"/>
-              <a:t>Dillemas</a:t>
-            </a:r>
-            <a:endParaRPr lang="en-US" dirty="0"/>
           </a:p>
         </p:txBody>
       </p:sp>
@@ -23274,7 +25123,7 @@
 </p:sld>
 </file>
 
-<file path=ppt/slides/slide43.xml><?xml version="1.0" encoding="utf-8"?>
+<file path=ppt/slides/slide46.xml><?xml version="1.0" encoding="utf-8"?>
 <p:sld xmlns:a="http://schemas.openxmlformats.org/drawingml/2006/main" xmlns:r="http://schemas.openxmlformats.org/officeDocument/2006/relationships" xmlns:p="http://schemas.openxmlformats.org/presentationml/2006/main">
   <p:cSld>
     <p:bg>
@@ -23365,7 +25214,7 @@
 </p:sld>
 </file>
 
-<file path=ppt/slides/slide44.xml><?xml version="1.0" encoding="utf-8"?>
+<file path=ppt/slides/slide47.xml><?xml version="1.0" encoding="utf-8"?>
 <p:sld xmlns:a="http://schemas.openxmlformats.org/drawingml/2006/main" xmlns:r="http://schemas.openxmlformats.org/officeDocument/2006/relationships" xmlns:p="http://schemas.openxmlformats.org/presentationml/2006/main">
   <p:cSld>
     <p:spTree>
@@ -23448,7 +25297,7 @@
 </p:sld>
 </file>
 
-<file path=ppt/slides/slide45.xml><?xml version="1.0" encoding="utf-8"?>
+<file path=ppt/slides/slide48.xml><?xml version="1.0" encoding="utf-8"?>
 <p:sld xmlns:a="http://schemas.openxmlformats.org/drawingml/2006/main" xmlns:r="http://schemas.openxmlformats.org/officeDocument/2006/relationships" xmlns:p="http://schemas.openxmlformats.org/presentationml/2006/main">
   <p:cSld>
     <p:spTree>
@@ -24164,7 +26013,7 @@
         </p:xfrm>
         <a:graphic>
           <a:graphicData uri="http://schemas.openxmlformats.org/drawingml/2006/diagram">
-            <dgm:relIds xmlns:dgm="http://schemas.openxmlformats.org/drawingml/2006/diagram" xmlns:r="http://schemas.openxmlformats.org/officeDocument/2006/relationships" r:dm="rId2" r:lo="rId3" r:qs="rId4" r:cs="rId5"/>
+            <dgm:relIds xmlns:dgm="http://schemas.openxmlformats.org/drawingml/2006/diagram" xmlns:r="http://schemas.openxmlformats.org/officeDocument/2006/relationships" r:dm="rId3" r:lo="rId4" r:qs="rId5" r:cs="rId6"/>
           </a:graphicData>
         </a:graphic>
       </p:graphicFrame>

</xml_diff>